<commit_message>
updating demo and slides
</commit_message>
<xml_diff>
--- a/2018/Site Creation/Slides/Improved Site Creation, Governance & Self Service.pptx
+++ b/2018/Site Creation/Slides/Improved Site Creation, Governance & Self Service.pptx
@@ -17,8 +17,8 @@
     <p:sldId id="263" r:id="rId8"/>
     <p:sldId id="261" r:id="rId9"/>
     <p:sldId id="262" r:id="rId10"/>
-    <p:sldId id="268" r:id="rId11"/>
-    <p:sldId id="289" r:id="rId12"/>
+    <p:sldId id="289" r:id="rId11"/>
+    <p:sldId id="268" r:id="rId12"/>
     <p:sldId id="288" r:id="rId13"/>
     <p:sldId id="267" r:id="rId14"/>
     <p:sldId id="280" r:id="rId15"/>
@@ -2827,7 +2827,7 @@
       <dgm:prSet presAssocID="{99042B87-9803-4848-B257-E36DC89E9AE2}" presName="accentRepeatNode" presStyleLbl="solidFgAcc1" presStyleIdx="0" presStyleCnt="3"/>
       <dgm:spPr/>
     </dgm:pt>
-    <dgm:pt modelId="{4EA41DB7-8C19-4881-9813-A50D7B5F07AC}" type="pres">
+    <dgm:pt modelId="{B52A4B34-9AE9-4308-A5BA-03A9720E701F}" type="pres">
       <dgm:prSet presAssocID="{0B276A47-2D4F-4671-84C8-1C934509EB27}" presName="text_2" presStyleLbl="node1" presStyleIdx="1" presStyleCnt="3">
         <dgm:presLayoutVars>
           <dgm:bulletEnabled val="1"/>
@@ -2835,7 +2835,7 @@
       </dgm:prSet>
       <dgm:spPr/>
     </dgm:pt>
-    <dgm:pt modelId="{53C3AEFF-E2A1-406C-811D-F5C35CCB528A}" type="pres">
+    <dgm:pt modelId="{A28E5EF4-2061-4AC8-8420-20F6DCF5723D}" type="pres">
       <dgm:prSet presAssocID="{0B276A47-2D4F-4671-84C8-1C934509EB27}" presName="accent_2" presStyleCnt="0"/>
       <dgm:spPr/>
     </dgm:pt>
@@ -2843,7 +2843,7 @@
       <dgm:prSet presAssocID="{0B276A47-2D4F-4671-84C8-1C934509EB27}" presName="accentRepeatNode" presStyleLbl="solidFgAcc1" presStyleIdx="1" presStyleCnt="3"/>
       <dgm:spPr/>
     </dgm:pt>
-    <dgm:pt modelId="{9D10D5FB-E245-41A7-AD7C-ABFCFD6B55DC}" type="pres">
+    <dgm:pt modelId="{B6A8617C-5A78-4827-B647-AB323D1BCDCC}" type="pres">
       <dgm:prSet presAssocID="{E5363470-A251-4C64-AA32-8003273182E1}" presName="text_3" presStyleLbl="node1" presStyleIdx="2" presStyleCnt="3">
         <dgm:presLayoutVars>
           <dgm:bulletEnabled val="1"/>
@@ -2851,7 +2851,7 @@
       </dgm:prSet>
       <dgm:spPr/>
     </dgm:pt>
-    <dgm:pt modelId="{0372176E-F4DB-4174-94F8-F06DFBC1F081}" type="pres">
+    <dgm:pt modelId="{077060FC-9971-4427-B979-15257144DF1B}" type="pres">
       <dgm:prSet presAssocID="{E5363470-A251-4C64-AA32-8003273182E1}" presName="accent_3" presStyleCnt="0"/>
       <dgm:spPr/>
     </dgm:pt>
@@ -2861,11 +2861,11 @@
     </dgm:pt>
   </dgm:ptLst>
   <dgm:cxnLst>
+    <dgm:cxn modelId="{DFECE901-F41A-4B0F-9223-B1855A6670DC}" type="presOf" srcId="{0B276A47-2D4F-4671-84C8-1C934509EB27}" destId="{B52A4B34-9AE9-4308-A5BA-03A9720E701F}" srcOrd="0" destOrd="0" presId="urn:microsoft.com/office/officeart/2008/layout/VerticalCurvedList"/>
     <dgm:cxn modelId="{D668AC14-E47E-424B-A2EE-944D72F5E8D4}" srcId="{845BC4D9-3593-41BE-83AE-229E8CE2630F}" destId="{99042B87-9803-4848-B257-E36DC89E9AE2}" srcOrd="0" destOrd="0" parTransId="{34458E3C-5F87-4796-A29A-31A4E7B20121}" sibTransId="{F1A86BFE-BFBE-40A6-8FCC-0EF3BABEE8E1}"/>
     <dgm:cxn modelId="{DFA9D72E-1EBC-485E-8790-F71C52DDCDDF}" type="presOf" srcId="{845BC4D9-3593-41BE-83AE-229E8CE2630F}" destId="{1E9ED667-C599-4EE1-A306-3C2BA8A3C141}" srcOrd="0" destOrd="0" presId="urn:microsoft.com/office/officeart/2008/layout/VerticalCurvedList"/>
-    <dgm:cxn modelId="{27BBFC41-C363-446B-A7F9-62C0BD2B00E6}" type="presOf" srcId="{0B276A47-2D4F-4671-84C8-1C934509EB27}" destId="{4EA41DB7-8C19-4881-9813-A50D7B5F07AC}" srcOrd="0" destOrd="0" presId="urn:microsoft.com/office/officeart/2008/layout/VerticalCurvedList"/>
-    <dgm:cxn modelId="{DF58354C-C395-4216-92EE-A6E8B98CD976}" type="presOf" srcId="{F1A86BFE-BFBE-40A6-8FCC-0EF3BABEE8E1}" destId="{D4E5D4F5-16C8-42AE-ADBD-D74737CAF1B4}" srcOrd="0" destOrd="0" presId="urn:microsoft.com/office/officeart/2008/layout/VerticalCurvedList"/>
-    <dgm:cxn modelId="{CD143D4D-0BBC-4376-A641-98285CE9323F}" type="presOf" srcId="{E5363470-A251-4C64-AA32-8003273182E1}" destId="{9D10D5FB-E245-41A7-AD7C-ABFCFD6B55DC}" srcOrd="0" destOrd="0" presId="urn:microsoft.com/office/officeart/2008/layout/VerticalCurvedList"/>
+    <dgm:cxn modelId="{224FDF4F-D7B7-4B3B-AA27-81C4DDB838B3}" type="presOf" srcId="{F1A86BFE-BFBE-40A6-8FCC-0EF3BABEE8E1}" destId="{D4E5D4F5-16C8-42AE-ADBD-D74737CAF1B4}" srcOrd="0" destOrd="0" presId="urn:microsoft.com/office/officeart/2008/layout/VerticalCurvedList"/>
+    <dgm:cxn modelId="{AB13AB78-EE78-41FA-A3AE-6122D9EF0836}" type="presOf" srcId="{E5363470-A251-4C64-AA32-8003273182E1}" destId="{B6A8617C-5A78-4827-B647-AB323D1BCDCC}" srcOrd="0" destOrd="0" presId="urn:microsoft.com/office/officeart/2008/layout/VerticalCurvedList"/>
     <dgm:cxn modelId="{C3ECD29E-6AE8-4983-918F-94B3BE979338}" srcId="{845BC4D9-3593-41BE-83AE-229E8CE2630F}" destId="{0B276A47-2D4F-4671-84C8-1C934509EB27}" srcOrd="1" destOrd="0" parTransId="{93863D77-170D-463E-83A0-9B7F0009A45C}" sibTransId="{4D679664-620B-46D5-9338-663B246898D3}"/>
     <dgm:cxn modelId="{F26F94F4-5D72-49B3-89E5-28DAC2746589}" type="presOf" srcId="{99042B87-9803-4848-B257-E36DC89E9AE2}" destId="{26C97555-149C-4DE5-85A1-D39CA54BEB42}" srcOrd="0" destOrd="0" presId="urn:microsoft.com/office/officeart/2008/layout/VerticalCurvedList"/>
     <dgm:cxn modelId="{4E2E5DF9-0ABB-4416-8601-0555FA265C5E}" srcId="{845BC4D9-3593-41BE-83AE-229E8CE2630F}" destId="{E5363470-A251-4C64-AA32-8003273182E1}" srcOrd="2" destOrd="0" parTransId="{225781BE-F36C-44F9-B4F7-D79D8EEA3D87}" sibTransId="{8C7781AA-0DAD-4988-A7BD-1A4BD77C13CD}"/>
@@ -2878,12 +2878,12 @@
     <dgm:cxn modelId="{310551D6-5AFA-4085-8892-47D28BFA710C}" type="presParOf" srcId="{0A28E28F-BAF9-47AA-B6AD-E1F4ED36E49B}" destId="{26C97555-149C-4DE5-85A1-D39CA54BEB42}" srcOrd="1" destOrd="0" presId="urn:microsoft.com/office/officeart/2008/layout/VerticalCurvedList"/>
     <dgm:cxn modelId="{A1C851F0-CF7F-46B7-8AC6-3305C461A9A8}" type="presParOf" srcId="{0A28E28F-BAF9-47AA-B6AD-E1F4ED36E49B}" destId="{BCEA672A-9469-4697-B02B-6FA7C0BE1AAD}" srcOrd="2" destOrd="0" presId="urn:microsoft.com/office/officeart/2008/layout/VerticalCurvedList"/>
     <dgm:cxn modelId="{FDF69FAC-CA6E-49E3-A9D6-3E99C626D0D7}" type="presParOf" srcId="{BCEA672A-9469-4697-B02B-6FA7C0BE1AAD}" destId="{C313AEAC-0E84-4290-8B21-E37DEBB3C53E}" srcOrd="0" destOrd="0" presId="urn:microsoft.com/office/officeart/2008/layout/VerticalCurvedList"/>
-    <dgm:cxn modelId="{16D2ABBF-9AB0-42C1-975F-987ED55954C8}" type="presParOf" srcId="{0A28E28F-BAF9-47AA-B6AD-E1F4ED36E49B}" destId="{4EA41DB7-8C19-4881-9813-A50D7B5F07AC}" srcOrd="3" destOrd="0" presId="urn:microsoft.com/office/officeart/2008/layout/VerticalCurvedList"/>
-    <dgm:cxn modelId="{FC74B129-41EE-4CFB-98A0-0C247B80F26D}" type="presParOf" srcId="{0A28E28F-BAF9-47AA-B6AD-E1F4ED36E49B}" destId="{53C3AEFF-E2A1-406C-811D-F5C35CCB528A}" srcOrd="4" destOrd="0" presId="urn:microsoft.com/office/officeart/2008/layout/VerticalCurvedList"/>
-    <dgm:cxn modelId="{21803703-5DD7-4193-AE0A-5C9552ABE146}" type="presParOf" srcId="{53C3AEFF-E2A1-406C-811D-F5C35CCB528A}" destId="{1A214D16-3FE5-4AF4-961C-FC54722F9541}" srcOrd="0" destOrd="0" presId="urn:microsoft.com/office/officeart/2008/layout/VerticalCurvedList"/>
-    <dgm:cxn modelId="{A7E165AC-CA5D-4559-B0A7-9401D517F073}" type="presParOf" srcId="{0A28E28F-BAF9-47AA-B6AD-E1F4ED36E49B}" destId="{9D10D5FB-E245-41A7-AD7C-ABFCFD6B55DC}" srcOrd="5" destOrd="0" presId="urn:microsoft.com/office/officeart/2008/layout/VerticalCurvedList"/>
-    <dgm:cxn modelId="{DCE28545-B3CB-4CE7-AD2B-305866B857B4}" type="presParOf" srcId="{0A28E28F-BAF9-47AA-B6AD-E1F4ED36E49B}" destId="{0372176E-F4DB-4174-94F8-F06DFBC1F081}" srcOrd="6" destOrd="0" presId="urn:microsoft.com/office/officeart/2008/layout/VerticalCurvedList"/>
-    <dgm:cxn modelId="{AD3486CA-2B14-4874-8948-9DD7749C3A11}" type="presParOf" srcId="{0372176E-F4DB-4174-94F8-F06DFBC1F081}" destId="{AE75F136-F12F-4966-BF6B-67E07E10D0FE}" srcOrd="0" destOrd="0" presId="urn:microsoft.com/office/officeart/2008/layout/VerticalCurvedList"/>
+    <dgm:cxn modelId="{A1D9612E-8F85-4261-BA40-B7A8343E6ACE}" type="presParOf" srcId="{0A28E28F-BAF9-47AA-B6AD-E1F4ED36E49B}" destId="{B52A4B34-9AE9-4308-A5BA-03A9720E701F}" srcOrd="3" destOrd="0" presId="urn:microsoft.com/office/officeart/2008/layout/VerticalCurvedList"/>
+    <dgm:cxn modelId="{35849813-84E5-47A5-BE50-C6EBE299771F}" type="presParOf" srcId="{0A28E28F-BAF9-47AA-B6AD-E1F4ED36E49B}" destId="{A28E5EF4-2061-4AC8-8420-20F6DCF5723D}" srcOrd="4" destOrd="0" presId="urn:microsoft.com/office/officeart/2008/layout/VerticalCurvedList"/>
+    <dgm:cxn modelId="{39D68DE0-234D-43FF-90F5-9F395A509F93}" type="presParOf" srcId="{A28E5EF4-2061-4AC8-8420-20F6DCF5723D}" destId="{1A214D16-3FE5-4AF4-961C-FC54722F9541}" srcOrd="0" destOrd="0" presId="urn:microsoft.com/office/officeart/2008/layout/VerticalCurvedList"/>
+    <dgm:cxn modelId="{7866D497-3AA1-49EF-B3CF-3A5316DEC1DF}" type="presParOf" srcId="{0A28E28F-BAF9-47AA-B6AD-E1F4ED36E49B}" destId="{B6A8617C-5A78-4827-B647-AB323D1BCDCC}" srcOrd="5" destOrd="0" presId="urn:microsoft.com/office/officeart/2008/layout/VerticalCurvedList"/>
+    <dgm:cxn modelId="{650B010C-36AB-4BF3-BDF6-DCCB1A8C3DCC}" type="presParOf" srcId="{0A28E28F-BAF9-47AA-B6AD-E1F4ED36E49B}" destId="{077060FC-9971-4427-B979-15257144DF1B}" srcOrd="6" destOrd="0" presId="urn:microsoft.com/office/officeart/2008/layout/VerticalCurvedList"/>
+    <dgm:cxn modelId="{5EF0250C-5D91-4FB3-84CB-78268CEA8DB7}" type="presParOf" srcId="{077060FC-9971-4427-B979-15257144DF1B}" destId="{AE75F136-F12F-4966-BF6B-67E07E10D0FE}" srcOrd="0" destOrd="0" presId="urn:microsoft.com/office/officeart/2008/layout/VerticalCurvedList"/>
   </dgm:cxnLst>
   <dgm:bg/>
   <dgm:whole/>
@@ -4130,7 +4130,7 @@
         <a:fontRef idx="minor"/>
       </dsp:style>
     </dsp:sp>
-    <dsp:sp modelId="{4EA41DB7-8C19-4881-9813-A50D7B5F07AC}">
+    <dsp:sp modelId="{B52A4B34-9AE9-4308-A5BA-03A9720E701F}">
       <dsp:nvSpPr>
         <dsp:cNvPr id="0" name=""/>
         <dsp:cNvSpPr/>
@@ -4257,7 +4257,7 @@
         <a:fontRef idx="minor"/>
       </dsp:style>
     </dsp:sp>
-    <dsp:sp modelId="{9D10D5FB-E245-41A7-AD7C-ABFCFD6B55DC}">
+    <dsp:sp modelId="{B6A8617C-5A78-4827-B647-AB323D1BCDCC}">
       <dsp:nvSpPr>
         <dsp:cNvPr id="0" name=""/>
         <dsp:cNvSpPr/>
@@ -10548,7 +10548,7 @@
           <a:p>
             <a:fld id="{DC68B771-8A77-4EE3-A926-874D96AC88C1}" type="datetimeFigureOut">
               <a:rPr lang="en-ZA" smtClean="0"/>
-              <a:t>16 Feb 2018</a:t>
+              <a:t>18 Feb 2018</a:t>
             </a:fld>
             <a:endParaRPr lang="en-ZA"/>
           </a:p>
@@ -11016,7 +11016,7 @@
           <a:p>
             <a:fld id="{C8F7DF0B-6DBF-49E1-99D2-6A728468D61E}" type="datetime1">
               <a:rPr lang="en-US" smtClean="0"/>
-              <a:t>2/16/2018</a:t>
+              <a:t>2/18/2018</a:t>
             </a:fld>
             <a:endParaRPr lang="en-US" dirty="0"/>
           </a:p>
@@ -11425,7 +11425,7 @@
           <a:p>
             <a:fld id="{C8F7DF0B-6DBF-49E1-99D2-6A728468D61E}" type="datetime1">
               <a:rPr lang="en-US" smtClean="0"/>
-              <a:t>2/16/2018</a:t>
+              <a:t>2/18/2018</a:t>
             </a:fld>
             <a:endParaRPr lang="en-US" dirty="0"/>
           </a:p>
@@ -11814,7 +11814,7 @@
           <a:p>
             <a:fld id="{C8F7DF0B-6DBF-49E1-99D2-6A728468D61E}" type="datetime1">
               <a:rPr lang="en-US" smtClean="0"/>
-              <a:t>2/16/2018</a:t>
+              <a:t>2/18/2018</a:t>
             </a:fld>
             <a:endParaRPr lang="en-US" dirty="0"/>
           </a:p>
@@ -12035,7 +12035,7 @@
           <a:p>
             <a:fld id="{C8F7DF0B-6DBF-49E1-99D2-6A728468D61E}" type="datetime1">
               <a:rPr lang="en-US" smtClean="0"/>
-              <a:t>2/16/2018</a:t>
+              <a:t>2/18/2018</a:t>
             </a:fld>
             <a:endParaRPr lang="en-US" dirty="0"/>
           </a:p>
@@ -12616,7 +12616,7 @@
                 </a:solidFill>
               </a:rPr>
               <a:pPr defTabSz="914363"/>
-              <a:t>2/16/2018</a:t>
+              <a:t>2/18/2018</a:t>
             </a:fld>
             <a:endParaRPr lang="en-US" dirty="0">
               <a:solidFill>
@@ -12955,7 +12955,7 @@
           <a:p>
             <a:fld id="{C8F7DF0B-6DBF-49E1-99D2-6A728468D61E}" type="datetime1">
               <a:rPr lang="en-US" smtClean="0"/>
-              <a:t>2/16/2018</a:t>
+              <a:t>2/18/2018</a:t>
             </a:fld>
             <a:endParaRPr lang="en-US" dirty="0"/>
           </a:p>
@@ -12986,7 +12986,7 @@
           <a:p>
             <a:fld id="{B4008EB6-D09E-4580-8CD6-DDB14511944F}" type="slidenum">
               <a:rPr lang="en-US" smtClean="0"/>
-              <a:t>11</a:t>
+              <a:t>10</a:t>
             </a:fld>
             <a:endParaRPr lang="en-US" dirty="0"/>
           </a:p>
@@ -13446,7 +13446,7 @@
           <a:p>
             <a:fld id="{A12B6E17-DEB9-4DCA-85D4-3F97A326E615}" type="datetimeFigureOut">
               <a:rPr lang="en-ZA" smtClean="0"/>
-              <a:t>16 Feb 2018</a:t>
+              <a:t>18 Feb 2018</a:t>
             </a:fld>
             <a:endParaRPr lang="en-ZA"/>
           </a:p>
@@ -13646,7 +13646,7 @@
           <a:p>
             <a:fld id="{A12B6E17-DEB9-4DCA-85D4-3F97A326E615}" type="datetimeFigureOut">
               <a:rPr lang="en-ZA" smtClean="0"/>
-              <a:t>16 Feb 2018</a:t>
+              <a:t>18 Feb 2018</a:t>
             </a:fld>
             <a:endParaRPr lang="en-ZA"/>
           </a:p>
@@ -13856,7 +13856,7 @@
           <a:p>
             <a:fld id="{A12B6E17-DEB9-4DCA-85D4-3F97A326E615}" type="datetimeFigureOut">
               <a:rPr lang="en-ZA" smtClean="0"/>
-              <a:t>16 Feb 2018</a:t>
+              <a:t>18 Feb 2018</a:t>
             </a:fld>
             <a:endParaRPr lang="en-ZA"/>
           </a:p>
@@ -14509,7 +14509,7 @@
           <a:p>
             <a:fld id="{A12B6E17-DEB9-4DCA-85D4-3F97A326E615}" type="datetimeFigureOut">
               <a:rPr lang="en-ZA" smtClean="0"/>
-              <a:t>16 Feb 2018</a:t>
+              <a:t>18 Feb 2018</a:t>
             </a:fld>
             <a:endParaRPr lang="en-ZA"/>
           </a:p>
@@ -14785,7 +14785,7 @@
           <a:p>
             <a:fld id="{A12B6E17-DEB9-4DCA-85D4-3F97A326E615}" type="datetimeFigureOut">
               <a:rPr lang="en-ZA" smtClean="0"/>
-              <a:t>16 Feb 2018</a:t>
+              <a:t>18 Feb 2018</a:t>
             </a:fld>
             <a:endParaRPr lang="en-ZA"/>
           </a:p>
@@ -15053,7 +15053,7 @@
           <a:p>
             <a:fld id="{A12B6E17-DEB9-4DCA-85D4-3F97A326E615}" type="datetimeFigureOut">
               <a:rPr lang="en-ZA" smtClean="0"/>
-              <a:t>16 Feb 2018</a:t>
+              <a:t>18 Feb 2018</a:t>
             </a:fld>
             <a:endParaRPr lang="en-ZA"/>
           </a:p>
@@ -15468,7 +15468,7 @@
           <a:p>
             <a:fld id="{A12B6E17-DEB9-4DCA-85D4-3F97A326E615}" type="datetimeFigureOut">
               <a:rPr lang="en-ZA" smtClean="0"/>
-              <a:t>16 Feb 2018</a:t>
+              <a:t>18 Feb 2018</a:t>
             </a:fld>
             <a:endParaRPr lang="en-ZA"/>
           </a:p>
@@ -15610,7 +15610,7 @@
           <a:p>
             <a:fld id="{A12B6E17-DEB9-4DCA-85D4-3F97A326E615}" type="datetimeFigureOut">
               <a:rPr lang="en-ZA" smtClean="0"/>
-              <a:t>16 Feb 2018</a:t>
+              <a:t>18 Feb 2018</a:t>
             </a:fld>
             <a:endParaRPr lang="en-ZA"/>
           </a:p>
@@ -15723,7 +15723,7 @@
           <a:p>
             <a:fld id="{A12B6E17-DEB9-4DCA-85D4-3F97A326E615}" type="datetimeFigureOut">
               <a:rPr lang="en-ZA" smtClean="0"/>
-              <a:t>16 Feb 2018</a:t>
+              <a:t>18 Feb 2018</a:t>
             </a:fld>
             <a:endParaRPr lang="en-ZA"/>
           </a:p>
@@ -16036,7 +16036,7 @@
           <a:p>
             <a:fld id="{A12B6E17-DEB9-4DCA-85D4-3F97A326E615}" type="datetimeFigureOut">
               <a:rPr lang="en-ZA" smtClean="0"/>
-              <a:t>16 Feb 2018</a:t>
+              <a:t>18 Feb 2018</a:t>
             </a:fld>
             <a:endParaRPr lang="en-ZA"/>
           </a:p>
@@ -16325,7 +16325,7 @@
           <a:p>
             <a:fld id="{A12B6E17-DEB9-4DCA-85D4-3F97A326E615}" type="datetimeFigureOut">
               <a:rPr lang="en-ZA" smtClean="0"/>
-              <a:t>16 Feb 2018</a:t>
+              <a:t>18 Feb 2018</a:t>
             </a:fld>
             <a:endParaRPr lang="en-ZA"/>
           </a:p>
@@ -16568,7 +16568,7 @@
           <a:p>
             <a:fld id="{A12B6E17-DEB9-4DCA-85D4-3F97A326E615}" type="datetimeFigureOut">
               <a:rPr lang="en-ZA" smtClean="0"/>
-              <a:t>16 Feb 2018</a:t>
+              <a:t>18 Feb 2018</a:t>
             </a:fld>
             <a:endParaRPr lang="en-ZA"/>
           </a:p>
@@ -17075,6 +17075,234 @@
 </file>
 
 <file path=ppt/slides/slide10.xml><?xml version="1.0" encoding="utf-8"?>
+<p:sld xmlns:a="http://schemas.openxmlformats.org/drawingml/2006/main" xmlns:r="http://schemas.openxmlformats.org/officeDocument/2006/relationships" xmlns:p="http://schemas.openxmlformats.org/presentationml/2006/main">
+  <p:cSld>
+    <p:spTree>
+      <p:nvGrpSpPr>
+        <p:cNvPr id="1" name=""/>
+        <p:cNvGrpSpPr/>
+        <p:nvPr/>
+      </p:nvGrpSpPr>
+      <p:grpSpPr>
+        <a:xfrm>
+          <a:off x="0" y="0"/>
+          <a:ext cx="0" cy="0"/>
+          <a:chOff x="0" y="0"/>
+          <a:chExt cx="0" cy="0"/>
+        </a:xfrm>
+      </p:grpSpPr>
+      <p:pic>
+        <p:nvPicPr>
+          <p:cNvPr id="13" name="Picture 12"/>
+          <p:cNvPicPr>
+            <a:picLocks noChangeAspect="1"/>
+          </p:cNvPicPr>
+          <p:nvPr/>
+        </p:nvPicPr>
+        <p:blipFill rotWithShape="1">
+          <a:blip r:embed="rId3">
+            <a:extLst>
+              <a:ext uri="{28A0092B-C50C-407E-A947-70E740481C1C}">
+                <a14:useLocalDpi xmlns:a14="http://schemas.microsoft.com/office/drawing/2010/main" val="0"/>
+              </a:ext>
+            </a:extLst>
+          </a:blip>
+          <a:srcRect t="15635"/>
+          <a:stretch/>
+        </p:blipFill>
+        <p:spPr>
+          <a:xfrm>
+            <a:off x="-39608" y="-13648"/>
+            <a:ext cx="12227106" cy="6871648"/>
+          </a:xfrm>
+          <a:prstGeom prst="rect">
+            <a:avLst/>
+          </a:prstGeom>
+        </p:spPr>
+      </p:pic>
+      <p:sp>
+        <p:nvSpPr>
+          <p:cNvPr id="6" name="Rectangle 5"/>
+          <p:cNvSpPr/>
+          <p:nvPr/>
+        </p:nvSpPr>
+        <p:spPr bwMode="auto">
+          <a:xfrm rot="16200000" flipH="1" flipV="1">
+            <a:off x="2573838" y="-2676273"/>
+            <a:ext cx="6871646" cy="12224192"/>
+          </a:xfrm>
+          <a:prstGeom prst="rect">
+            <a:avLst/>
+          </a:prstGeom>
+          <a:gradFill>
+            <a:gsLst>
+              <a:gs pos="40000">
+                <a:srgbClr val="000000">
+                  <a:alpha val="0"/>
+                </a:srgbClr>
+              </a:gs>
+              <a:gs pos="100000">
+                <a:srgbClr val="000000"/>
+              </a:gs>
+            </a:gsLst>
+            <a:lin ang="3000000" scaled="0"/>
+          </a:gradFill>
+          <a:ln>
+            <a:noFill/>
+            <a:headEnd type="none" w="med" len="med"/>
+            <a:tailEnd type="none" w="med" len="med"/>
+          </a:ln>
+        </p:spPr>
+        <p:style>
+          <a:lnRef idx="1">
+            <a:schemeClr val="accent2"/>
+          </a:lnRef>
+          <a:fillRef idx="3">
+            <a:schemeClr val="accent2"/>
+          </a:fillRef>
+          <a:effectRef idx="2">
+            <a:schemeClr val="accent2"/>
+          </a:effectRef>
+          <a:fontRef idx="minor">
+            <a:schemeClr val="lt1"/>
+          </a:fontRef>
+        </p:style>
+        <p:txBody>
+          <a:bodyPr vert="horz" wrap="square" lIns="91384" tIns="45692" rIns="91384" bIns="45692" numCol="1" rtlCol="0" anchor="ctr" anchorCtr="0" compatLnSpc="1">
+            <a:prstTxWarp prst="textNoShape">
+              <a:avLst/>
+            </a:prstTxWarp>
+          </a:bodyPr>
+          <a:lstStyle/>
+          <a:p>
+            <a:pPr algn="ctr" defTabSz="913513" fontAlgn="base">
+              <a:spcBef>
+                <a:spcPct val="0"/>
+              </a:spcBef>
+              <a:spcAft>
+                <a:spcPct val="0"/>
+              </a:spcAft>
+            </a:pPr>
+            <a:endParaRPr lang="en-US" sz="2298" dirty="0">
+              <a:gradFill>
+                <a:gsLst>
+                  <a:gs pos="0">
+                    <a:srgbClr val="FFFFFF"/>
+                  </a:gs>
+                  <a:gs pos="100000">
+                    <a:srgbClr val="FFFFFF"/>
+                  </a:gs>
+                </a:gsLst>
+                <a:lin ang="5400000" scaled="0"/>
+              </a:gradFill>
+            </a:endParaRPr>
+          </a:p>
+        </p:txBody>
+      </p:sp>
+      <p:sp>
+        <p:nvSpPr>
+          <p:cNvPr id="17" name="Title 1"/>
+          <p:cNvSpPr txBox="1">
+            <a:spLocks/>
+          </p:cNvSpPr>
+          <p:nvPr/>
+        </p:nvSpPr>
+        <p:spPr>
+          <a:xfrm>
+            <a:off x="426722" y="2781647"/>
+            <a:ext cx="9655584" cy="1599105"/>
+          </a:xfrm>
+          <a:prstGeom prst="rect">
+            <a:avLst/>
+          </a:prstGeom>
+        </p:spPr>
+        <p:txBody>
+          <a:bodyPr/>
+          <a:lstStyle>
+            <a:lvl1pPr algn="l" defTabSz="914363" rtl="0" eaLnBrk="1" latinLnBrk="0" hangingPunct="1">
+              <a:lnSpc>
+                <a:spcPct val="90000"/>
+              </a:lnSpc>
+              <a:spcBef>
+                <a:spcPct val="0"/>
+              </a:spcBef>
+              <a:buNone/>
+              <a:defRPr lang="en-US" sz="5400" b="0" kern="1200" cap="none" spc="-100" baseline="0" dirty="0" smtClean="0">
+                <a:ln w="3175">
+                  <a:noFill/>
+                </a:ln>
+                <a:gradFill>
+                  <a:gsLst>
+                    <a:gs pos="1250">
+                      <a:schemeClr val="tx2"/>
+                    </a:gs>
+                    <a:gs pos="100000">
+                      <a:schemeClr val="tx2"/>
+                    </a:gs>
+                  </a:gsLst>
+                  <a:lin ang="5400000" scaled="0"/>
+                </a:gradFill>
+                <a:effectLst/>
+                <a:latin typeface="+mj-lt"/>
+                <a:ea typeface="+mn-ea"/>
+                <a:cs typeface="Arial" charset="0"/>
+              </a:defRPr>
+            </a:lvl1pPr>
+          </a:lstStyle>
+          <a:p>
+            <a:pPr>
+              <a:lnSpc>
+                <a:spcPct val="80000"/>
+              </a:lnSpc>
+            </a:pPr>
+            <a:r>
+              <a:rPr lang="en-US" sz="7200" dirty="0">
+                <a:solidFill>
+                  <a:schemeClr val="bg1"/>
+                </a:solidFill>
+              </a:rPr>
+              <a:t>Demo</a:t>
+            </a:r>
+          </a:p>
+          <a:p>
+            <a:pPr>
+              <a:lnSpc>
+                <a:spcPct val="80000"/>
+              </a:lnSpc>
+            </a:pPr>
+            <a:r>
+              <a:rPr lang="en-US" sz="4800" dirty="0">
+                <a:solidFill>
+                  <a:schemeClr val="bg1"/>
+                </a:solidFill>
+              </a:rPr>
+              <a:t>        PnP Provisioning Template</a:t>
+            </a:r>
+            <a:endParaRPr lang="en-US" sz="3600" dirty="0">
+              <a:solidFill>
+                <a:schemeClr val="bg1"/>
+              </a:solidFill>
+            </a:endParaRPr>
+          </a:p>
+        </p:txBody>
+      </p:sp>
+    </p:spTree>
+    <p:extLst>
+      <p:ext uri="{BB962C8B-B14F-4D97-AF65-F5344CB8AC3E}">
+        <p14:creationId xmlns:p14="http://schemas.microsoft.com/office/powerpoint/2010/main" val="1524831323"/>
+      </p:ext>
+    </p:extLst>
+  </p:cSld>
+  <p:clrMapOvr>
+    <a:masterClrMapping/>
+  </p:clrMapOvr>
+  <p:transition spd="slow">
+    <p:push/>
+  </p:transition>
+</p:sld>
+</file>
+
+<file path=ppt/slides/slide11.xml><?xml version="1.0" encoding="utf-8"?>
 <p:sld xmlns:a="http://schemas.openxmlformats.org/drawingml/2006/main" xmlns:r="http://schemas.openxmlformats.org/officeDocument/2006/relationships" xmlns:p="http://schemas.openxmlformats.org/presentationml/2006/main">
   <p:cSld>
     <p:spTree>
@@ -18373,234 +18601,6 @@
 </p:sld>
 </file>
 
-<file path=ppt/slides/slide11.xml><?xml version="1.0" encoding="utf-8"?>
-<p:sld xmlns:a="http://schemas.openxmlformats.org/drawingml/2006/main" xmlns:r="http://schemas.openxmlformats.org/officeDocument/2006/relationships" xmlns:p="http://schemas.openxmlformats.org/presentationml/2006/main">
-  <p:cSld>
-    <p:spTree>
-      <p:nvGrpSpPr>
-        <p:cNvPr id="1" name=""/>
-        <p:cNvGrpSpPr/>
-        <p:nvPr/>
-      </p:nvGrpSpPr>
-      <p:grpSpPr>
-        <a:xfrm>
-          <a:off x="0" y="0"/>
-          <a:ext cx="0" cy="0"/>
-          <a:chOff x="0" y="0"/>
-          <a:chExt cx="0" cy="0"/>
-        </a:xfrm>
-      </p:grpSpPr>
-      <p:pic>
-        <p:nvPicPr>
-          <p:cNvPr id="13" name="Picture 12"/>
-          <p:cNvPicPr>
-            <a:picLocks noChangeAspect="1"/>
-          </p:cNvPicPr>
-          <p:nvPr/>
-        </p:nvPicPr>
-        <p:blipFill rotWithShape="1">
-          <a:blip r:embed="rId3">
-            <a:extLst>
-              <a:ext uri="{28A0092B-C50C-407E-A947-70E740481C1C}">
-                <a14:useLocalDpi xmlns:a14="http://schemas.microsoft.com/office/drawing/2010/main" val="0"/>
-              </a:ext>
-            </a:extLst>
-          </a:blip>
-          <a:srcRect t="15635"/>
-          <a:stretch/>
-        </p:blipFill>
-        <p:spPr>
-          <a:xfrm>
-            <a:off x="-39608" y="-13648"/>
-            <a:ext cx="12227106" cy="6871648"/>
-          </a:xfrm>
-          <a:prstGeom prst="rect">
-            <a:avLst/>
-          </a:prstGeom>
-        </p:spPr>
-      </p:pic>
-      <p:sp>
-        <p:nvSpPr>
-          <p:cNvPr id="6" name="Rectangle 5"/>
-          <p:cNvSpPr/>
-          <p:nvPr/>
-        </p:nvSpPr>
-        <p:spPr bwMode="auto">
-          <a:xfrm rot="16200000" flipH="1" flipV="1">
-            <a:off x="2573838" y="-2676273"/>
-            <a:ext cx="6871646" cy="12224192"/>
-          </a:xfrm>
-          <a:prstGeom prst="rect">
-            <a:avLst/>
-          </a:prstGeom>
-          <a:gradFill>
-            <a:gsLst>
-              <a:gs pos="40000">
-                <a:srgbClr val="000000">
-                  <a:alpha val="0"/>
-                </a:srgbClr>
-              </a:gs>
-              <a:gs pos="100000">
-                <a:srgbClr val="000000"/>
-              </a:gs>
-            </a:gsLst>
-            <a:lin ang="3000000" scaled="0"/>
-          </a:gradFill>
-          <a:ln>
-            <a:noFill/>
-            <a:headEnd type="none" w="med" len="med"/>
-            <a:tailEnd type="none" w="med" len="med"/>
-          </a:ln>
-        </p:spPr>
-        <p:style>
-          <a:lnRef idx="1">
-            <a:schemeClr val="accent2"/>
-          </a:lnRef>
-          <a:fillRef idx="3">
-            <a:schemeClr val="accent2"/>
-          </a:fillRef>
-          <a:effectRef idx="2">
-            <a:schemeClr val="accent2"/>
-          </a:effectRef>
-          <a:fontRef idx="minor">
-            <a:schemeClr val="lt1"/>
-          </a:fontRef>
-        </p:style>
-        <p:txBody>
-          <a:bodyPr vert="horz" wrap="square" lIns="91384" tIns="45692" rIns="91384" bIns="45692" numCol="1" rtlCol="0" anchor="ctr" anchorCtr="0" compatLnSpc="1">
-            <a:prstTxWarp prst="textNoShape">
-              <a:avLst/>
-            </a:prstTxWarp>
-          </a:bodyPr>
-          <a:lstStyle/>
-          <a:p>
-            <a:pPr algn="ctr" defTabSz="913513" fontAlgn="base">
-              <a:spcBef>
-                <a:spcPct val="0"/>
-              </a:spcBef>
-              <a:spcAft>
-                <a:spcPct val="0"/>
-              </a:spcAft>
-            </a:pPr>
-            <a:endParaRPr lang="en-US" sz="2298" dirty="0">
-              <a:gradFill>
-                <a:gsLst>
-                  <a:gs pos="0">
-                    <a:srgbClr val="FFFFFF"/>
-                  </a:gs>
-                  <a:gs pos="100000">
-                    <a:srgbClr val="FFFFFF"/>
-                  </a:gs>
-                </a:gsLst>
-                <a:lin ang="5400000" scaled="0"/>
-              </a:gradFill>
-            </a:endParaRPr>
-          </a:p>
-        </p:txBody>
-      </p:sp>
-      <p:sp>
-        <p:nvSpPr>
-          <p:cNvPr id="17" name="Title 1"/>
-          <p:cNvSpPr txBox="1">
-            <a:spLocks/>
-          </p:cNvSpPr>
-          <p:nvPr/>
-        </p:nvSpPr>
-        <p:spPr>
-          <a:xfrm>
-            <a:off x="426722" y="2781647"/>
-            <a:ext cx="9655584" cy="1599105"/>
-          </a:xfrm>
-          <a:prstGeom prst="rect">
-            <a:avLst/>
-          </a:prstGeom>
-        </p:spPr>
-        <p:txBody>
-          <a:bodyPr/>
-          <a:lstStyle>
-            <a:lvl1pPr algn="l" defTabSz="914363" rtl="0" eaLnBrk="1" latinLnBrk="0" hangingPunct="1">
-              <a:lnSpc>
-                <a:spcPct val="90000"/>
-              </a:lnSpc>
-              <a:spcBef>
-                <a:spcPct val="0"/>
-              </a:spcBef>
-              <a:buNone/>
-              <a:defRPr lang="en-US" sz="5400" b="0" kern="1200" cap="none" spc="-100" baseline="0" dirty="0" smtClean="0">
-                <a:ln w="3175">
-                  <a:noFill/>
-                </a:ln>
-                <a:gradFill>
-                  <a:gsLst>
-                    <a:gs pos="1250">
-                      <a:schemeClr val="tx2"/>
-                    </a:gs>
-                    <a:gs pos="100000">
-                      <a:schemeClr val="tx2"/>
-                    </a:gs>
-                  </a:gsLst>
-                  <a:lin ang="5400000" scaled="0"/>
-                </a:gradFill>
-                <a:effectLst/>
-                <a:latin typeface="+mj-lt"/>
-                <a:ea typeface="+mn-ea"/>
-                <a:cs typeface="Arial" charset="0"/>
-              </a:defRPr>
-            </a:lvl1pPr>
-          </a:lstStyle>
-          <a:p>
-            <a:pPr>
-              <a:lnSpc>
-                <a:spcPct val="80000"/>
-              </a:lnSpc>
-            </a:pPr>
-            <a:r>
-              <a:rPr lang="en-US" sz="7200" dirty="0">
-                <a:solidFill>
-                  <a:schemeClr val="bg1"/>
-                </a:solidFill>
-              </a:rPr>
-              <a:t>Demo</a:t>
-            </a:r>
-          </a:p>
-          <a:p>
-            <a:pPr>
-              <a:lnSpc>
-                <a:spcPct val="80000"/>
-              </a:lnSpc>
-            </a:pPr>
-            <a:r>
-              <a:rPr lang="en-US" sz="4800" dirty="0">
-                <a:solidFill>
-                  <a:schemeClr val="bg1"/>
-                </a:solidFill>
-              </a:rPr>
-              <a:t>        PnP Provisioning Template</a:t>
-            </a:r>
-            <a:endParaRPr lang="en-US" sz="3600" dirty="0">
-              <a:solidFill>
-                <a:schemeClr val="bg1"/>
-              </a:solidFill>
-            </a:endParaRPr>
-          </a:p>
-        </p:txBody>
-      </p:sp>
-    </p:spTree>
-    <p:extLst>
-      <p:ext uri="{BB962C8B-B14F-4D97-AF65-F5344CB8AC3E}">
-        <p14:creationId xmlns:p14="http://schemas.microsoft.com/office/powerpoint/2010/main" val="1524831323"/>
-      </p:ext>
-    </p:extLst>
-  </p:cSld>
-  <p:clrMapOvr>
-    <a:masterClrMapping/>
-  </p:clrMapOvr>
-  <p:transition spd="slow">
-    <p:push/>
-  </p:transition>
-</p:sld>
-</file>
-
 <file path=ppt/slides/slide12.xml><?xml version="1.0" encoding="utf-8"?>
 <p:sld xmlns:a="http://schemas.openxmlformats.org/drawingml/2006/main" xmlns:r="http://schemas.openxmlformats.org/officeDocument/2006/relationships" xmlns:p="http://schemas.openxmlformats.org/presentationml/2006/main">
   <p:cSld>
@@ -18970,8 +18970,8 @@
         </p:nvSpPr>
         <p:spPr>
           <a:xfrm>
-            <a:off x="4222378" y="3278393"/>
-            <a:ext cx="3944470" cy="1942353"/>
+            <a:off x="4222378" y="2848087"/>
+            <a:ext cx="3944470" cy="1526689"/>
           </a:xfrm>
           <a:prstGeom prst="rect">
             <a:avLst/>
@@ -19020,7 +19020,7 @@
         </p:nvSpPr>
         <p:spPr>
           <a:xfrm>
-            <a:off x="2405529" y="1851511"/>
+            <a:off x="2405529" y="1421205"/>
             <a:ext cx="7380942" cy="1426882"/>
           </a:xfrm>
           <a:prstGeom prst="rect">
@@ -19070,6 +19070,56 @@
               <a:t>)</a:t>
             </a:r>
             <a:endParaRPr lang="en-US" dirty="0"/>
+          </a:p>
+        </p:txBody>
+      </p:sp>
+      <p:sp>
+        <p:nvSpPr>
+          <p:cNvPr id="6" name="Rectangle 5">
+            <a:extLst>
+              <a:ext uri="{FF2B5EF4-FFF2-40B4-BE49-F238E27FC236}">
+                <a16:creationId xmlns:a16="http://schemas.microsoft.com/office/drawing/2014/main" id="{A49CEC6F-1794-4675-916A-95FAEE482578}"/>
+              </a:ext>
+            </a:extLst>
+          </p:cNvPr>
+          <p:cNvSpPr/>
+          <p:nvPr/>
+        </p:nvSpPr>
+        <p:spPr>
+          <a:xfrm>
+            <a:off x="1075766" y="4374776"/>
+            <a:ext cx="10148046" cy="1526689"/>
+          </a:xfrm>
+          <a:prstGeom prst="rect">
+            <a:avLst/>
+          </a:prstGeom>
+        </p:spPr>
+        <p:style>
+          <a:lnRef idx="2">
+            <a:schemeClr val="accent1">
+              <a:shade val="50000"/>
+            </a:schemeClr>
+          </a:lnRef>
+          <a:fillRef idx="1">
+            <a:schemeClr val="accent1"/>
+          </a:fillRef>
+          <a:effectRef idx="0">
+            <a:schemeClr val="accent1"/>
+          </a:effectRef>
+          <a:fontRef idx="minor">
+            <a:schemeClr val="lt1"/>
+          </a:fontRef>
+        </p:style>
+        <p:txBody>
+          <a:bodyPr rtlCol="0" anchor="ctr"/>
+          <a:lstStyle/>
+          <a:p>
+            <a:pPr algn="ctr"/>
+            <a:r>
+              <a:rPr lang="en-US" dirty="0"/>
+              <a:t>PnP “Stuff”</a:t>
+            </a:r>
+            <a:endParaRPr lang="en-ZA" dirty="0"/>
           </a:p>
         </p:txBody>
       </p:sp>
@@ -19120,7 +19170,7 @@
                                           </p:stCondLst>
                                         </p:cTn>
                                         <p:tgtEl>
-                                          <p:spTgt spid="4"/>
+                                          <p:spTgt spid="6"/>
                                         </p:tgtEl>
                                         <p:attrNameLst>
                                           <p:attrName>style.visibility</p:attrName>
@@ -19134,7 +19184,7 @@
                                       <p:cBhvr>
                                         <p:cTn id="7" dur="500"/>
                                         <p:tgtEl>
-                                          <p:spTgt spid="4"/>
+                                          <p:spTgt spid="6"/>
                                         </p:tgtEl>
                                       </p:cBhvr>
                                     </p:animEffect>
@@ -19173,6 +19223,59 @@
                                           </p:stCondLst>
                                         </p:cTn>
                                         <p:tgtEl>
+                                          <p:spTgt spid="4"/>
+                                        </p:tgtEl>
+                                        <p:attrNameLst>
+                                          <p:attrName>style.visibility</p:attrName>
+                                        </p:attrNameLst>
+                                      </p:cBhvr>
+                                      <p:to>
+                                        <p:strVal val="visible"/>
+                                      </p:to>
+                                    </p:set>
+                                    <p:animEffect transition="in" filter="fade">
+                                      <p:cBhvr>
+                                        <p:cTn id="12" dur="500"/>
+                                        <p:tgtEl>
+                                          <p:spTgt spid="4"/>
+                                        </p:tgtEl>
+                                      </p:cBhvr>
+                                    </p:animEffect>
+                                  </p:childTnLst>
+                                </p:cTn>
+                              </p:par>
+                            </p:childTnLst>
+                          </p:cTn>
+                        </p:par>
+                      </p:childTnLst>
+                    </p:cTn>
+                  </p:par>
+                  <p:par>
+                    <p:cTn id="13" fill="hold">
+                      <p:stCondLst>
+                        <p:cond delay="indefinite"/>
+                      </p:stCondLst>
+                      <p:childTnLst>
+                        <p:par>
+                          <p:cTn id="14" fill="hold">
+                            <p:stCondLst>
+                              <p:cond delay="0"/>
+                            </p:stCondLst>
+                            <p:childTnLst>
+                              <p:par>
+                                <p:cTn id="15" presetID="10" presetClass="entr" presetSubtype="0" fill="hold" grpId="0" nodeType="clickEffect">
+                                  <p:stCondLst>
+                                    <p:cond delay="0"/>
+                                  </p:stCondLst>
+                                  <p:childTnLst>
+                                    <p:set>
+                                      <p:cBhvr>
+                                        <p:cTn id="16" dur="1" fill="hold">
+                                          <p:stCondLst>
+                                            <p:cond delay="0"/>
+                                          </p:stCondLst>
+                                        </p:cTn>
+                                        <p:tgtEl>
                                           <p:spTgt spid="5"/>
                                         </p:tgtEl>
                                         <p:attrNameLst>
@@ -19185,7 +19288,7 @@
                                     </p:set>
                                     <p:animEffect transition="in" filter="fade">
                                       <p:cBhvr>
-                                        <p:cTn id="12" dur="500"/>
+                                        <p:cTn id="17" dur="500"/>
                                         <p:tgtEl>
                                           <p:spTgt spid="5"/>
                                         </p:tgtEl>
@@ -19224,6 +19327,7 @@
     <p:bldLst>
       <p:bldP spid="4" grpId="0" animBg="1"/>
       <p:bldP spid="5" grpId="0" animBg="1"/>
+      <p:bldP spid="6" grpId="0" animBg="1"/>
     </p:bldLst>
   </p:timing>
 </p:sld>
@@ -22512,6 +22616,110 @@
           </a:p>
         </p:txBody>
       </p:sp>
+      <p:sp>
+        <p:nvSpPr>
+          <p:cNvPr id="10" name="Rectangle: Rounded Corners 9">
+            <a:extLst>
+              <a:ext uri="{FF2B5EF4-FFF2-40B4-BE49-F238E27FC236}">
+                <a16:creationId xmlns:a16="http://schemas.microsoft.com/office/drawing/2014/main" id="{EE8B95D4-3061-41DA-AD08-78A5F8B45F2A}"/>
+              </a:ext>
+            </a:extLst>
+          </p:cNvPr>
+          <p:cNvSpPr/>
+          <p:nvPr/>
+        </p:nvSpPr>
+        <p:spPr>
+          <a:xfrm>
+            <a:off x="759338" y="1691386"/>
+            <a:ext cx="4201133" cy="567719"/>
+          </a:xfrm>
+          <a:prstGeom prst="roundRect">
+            <a:avLst/>
+          </a:prstGeom>
+          <a:noFill/>
+          <a:ln w="38100">
+            <a:solidFill>
+              <a:srgbClr val="FF0000"/>
+            </a:solidFill>
+          </a:ln>
+        </p:spPr>
+        <p:style>
+          <a:lnRef idx="2">
+            <a:schemeClr val="accent1">
+              <a:shade val="50000"/>
+            </a:schemeClr>
+          </a:lnRef>
+          <a:fillRef idx="1">
+            <a:schemeClr val="accent1"/>
+          </a:fillRef>
+          <a:effectRef idx="0">
+            <a:schemeClr val="accent1"/>
+          </a:effectRef>
+          <a:fontRef idx="minor">
+            <a:schemeClr val="lt1"/>
+          </a:fontRef>
+        </p:style>
+        <p:txBody>
+          <a:bodyPr rtlCol="0" anchor="ctr"/>
+          <a:lstStyle/>
+          <a:p>
+            <a:pPr algn="ctr"/>
+            <a:endParaRPr lang="en-ZA"/>
+          </a:p>
+        </p:txBody>
+      </p:sp>
+      <p:sp>
+        <p:nvSpPr>
+          <p:cNvPr id="11" name="Rectangle: Rounded Corners 10">
+            <a:extLst>
+              <a:ext uri="{FF2B5EF4-FFF2-40B4-BE49-F238E27FC236}">
+                <a16:creationId xmlns:a16="http://schemas.microsoft.com/office/drawing/2014/main" id="{81E5CD8E-A168-43F3-B1D1-31D23DE8EFE9}"/>
+              </a:ext>
+            </a:extLst>
+          </p:cNvPr>
+          <p:cNvSpPr/>
+          <p:nvPr/>
+        </p:nvSpPr>
+        <p:spPr>
+          <a:xfrm>
+            <a:off x="1703621" y="5624511"/>
+            <a:ext cx="4201133" cy="686641"/>
+          </a:xfrm>
+          <a:prstGeom prst="roundRect">
+            <a:avLst/>
+          </a:prstGeom>
+          <a:noFill/>
+          <a:ln w="38100">
+            <a:solidFill>
+              <a:srgbClr val="FF0000"/>
+            </a:solidFill>
+          </a:ln>
+        </p:spPr>
+        <p:style>
+          <a:lnRef idx="2">
+            <a:schemeClr val="accent1">
+              <a:shade val="50000"/>
+            </a:schemeClr>
+          </a:lnRef>
+          <a:fillRef idx="1">
+            <a:schemeClr val="accent1"/>
+          </a:fillRef>
+          <a:effectRef idx="0">
+            <a:schemeClr val="accent1"/>
+          </a:effectRef>
+          <a:fontRef idx="minor">
+            <a:schemeClr val="lt1"/>
+          </a:fontRef>
+        </p:style>
+        <p:txBody>
+          <a:bodyPr rtlCol="0" anchor="ctr"/>
+          <a:lstStyle/>
+          <a:p>
+            <a:pPr algn="ctr"/>
+            <a:endParaRPr lang="en-ZA"/>
+          </a:p>
+        </p:txBody>
+      </p:sp>
     </p:spTree>
     <p:extLst>
       <p:ext uri="{BB962C8B-B14F-4D97-AF65-F5344CB8AC3E}">
@@ -22704,7 +22912,7 @@
                             </p:stCondLst>
                             <p:childTnLst>
                               <p:par>
-                                <p:cTn id="19" presetID="22" presetClass="entr" presetSubtype="8" fill="hold" grpId="0" nodeType="clickEffect">
+                                <p:cTn id="19" presetID="21" presetClass="entr" presetSubtype="1" fill="hold" grpId="0" nodeType="clickEffect">
                                   <p:stCondLst>
                                     <p:cond delay="0"/>
                                   </p:stCondLst>
@@ -22717,11 +22925,7 @@
                                           </p:stCondLst>
                                         </p:cTn>
                                         <p:tgtEl>
-                                          <p:spTgt spid="8">
-                                            <p:txEl>
-                                              <p:pRg st="1" end="1"/>
-                                            </p:txEl>
-                                          </p:spTgt>
+                                          <p:spTgt spid="10"/>
                                         </p:tgtEl>
                                         <p:attrNameLst>
                                           <p:attrName>style.visibility</p:attrName>
@@ -22731,15 +22935,11 @@
                                         <p:strVal val="visible"/>
                                       </p:to>
                                     </p:set>
-                                    <p:animEffect transition="in" filter="wipe(left)">
+                                    <p:animEffect transition="in" filter="wheel(1)">
                                       <p:cBhvr>
                                         <p:cTn id="21" dur="500"/>
                                         <p:tgtEl>
-                                          <p:spTgt spid="8">
-                                            <p:txEl>
-                                              <p:pRg st="1" end="1"/>
-                                            </p:txEl>
-                                          </p:spTgt>
+                                          <p:spTgt spid="10"/>
                                         </p:tgtEl>
                                       </p:cBhvr>
                                     </p:animEffect>
@@ -22778,7 +22978,7 @@
                                           </p:stCondLst>
                                         </p:cTn>
                                         <p:tgtEl>
-                                          <p:spTgt spid="6"/>
+                                          <p:spTgt spid="11"/>
                                         </p:tgtEl>
                                         <p:attrNameLst>
                                           <p:attrName>style.visibility</p:attrName>
@@ -22792,6 +22992,120 @@
                                       <p:cBhvr>
                                         <p:cTn id="26" dur="500"/>
                                         <p:tgtEl>
+                                          <p:spTgt spid="11"/>
+                                        </p:tgtEl>
+                                      </p:cBhvr>
+                                    </p:animEffect>
+                                  </p:childTnLst>
+                                </p:cTn>
+                              </p:par>
+                            </p:childTnLst>
+                          </p:cTn>
+                        </p:par>
+                      </p:childTnLst>
+                    </p:cTn>
+                  </p:par>
+                  <p:par>
+                    <p:cTn id="27" fill="hold">
+                      <p:stCondLst>
+                        <p:cond delay="indefinite"/>
+                      </p:stCondLst>
+                      <p:childTnLst>
+                        <p:par>
+                          <p:cTn id="28" fill="hold">
+                            <p:stCondLst>
+                              <p:cond delay="0"/>
+                            </p:stCondLst>
+                            <p:childTnLst>
+                              <p:par>
+                                <p:cTn id="29" presetID="22" presetClass="entr" presetSubtype="8" fill="hold" grpId="0" nodeType="clickEffect">
+                                  <p:stCondLst>
+                                    <p:cond delay="0"/>
+                                  </p:stCondLst>
+                                  <p:childTnLst>
+                                    <p:set>
+                                      <p:cBhvr>
+                                        <p:cTn id="30" dur="1" fill="hold">
+                                          <p:stCondLst>
+                                            <p:cond delay="0"/>
+                                          </p:stCondLst>
+                                        </p:cTn>
+                                        <p:tgtEl>
+                                          <p:spTgt spid="8">
+                                            <p:txEl>
+                                              <p:pRg st="1" end="1"/>
+                                            </p:txEl>
+                                          </p:spTgt>
+                                        </p:tgtEl>
+                                        <p:attrNameLst>
+                                          <p:attrName>style.visibility</p:attrName>
+                                        </p:attrNameLst>
+                                      </p:cBhvr>
+                                      <p:to>
+                                        <p:strVal val="visible"/>
+                                      </p:to>
+                                    </p:set>
+                                    <p:animEffect transition="in" filter="wipe(left)">
+                                      <p:cBhvr>
+                                        <p:cTn id="31" dur="500"/>
+                                        <p:tgtEl>
+                                          <p:spTgt spid="8">
+                                            <p:txEl>
+                                              <p:pRg st="1" end="1"/>
+                                            </p:txEl>
+                                          </p:spTgt>
+                                        </p:tgtEl>
+                                      </p:cBhvr>
+                                    </p:animEffect>
+                                  </p:childTnLst>
+                                </p:cTn>
+                              </p:par>
+                            </p:childTnLst>
+                          </p:cTn>
+                        </p:par>
+                      </p:childTnLst>
+                    </p:cTn>
+                  </p:par>
+                  <p:par>
+                    <p:cTn id="32" fill="hold">
+                      <p:stCondLst>
+                        <p:cond delay="indefinite"/>
+                      </p:stCondLst>
+                      <p:childTnLst>
+                        <p:par>
+                          <p:cTn id="33" fill="hold">
+                            <p:stCondLst>
+                              <p:cond delay="0"/>
+                            </p:stCondLst>
+                            <p:childTnLst>
+                              <p:par>
+                                <p:cTn id="34" presetID="21" presetClass="entr" presetSubtype="1" fill="hold" grpId="0" nodeType="clickEffect">
+                                  <p:stCondLst>
+                                    <p:cond delay="0"/>
+                                  </p:stCondLst>
+                                  <p:childTnLst>
+                                    <p:set>
+                                      <p:cBhvr>
+                                        <p:cTn id="35" dur="1" fill="hold">
+                                          <p:stCondLst>
+                                            <p:cond delay="0"/>
+                                          </p:stCondLst>
+                                        </p:cTn>
+                                        <p:tgtEl>
+                                          <p:spTgt spid="6"/>
+                                        </p:tgtEl>
+                                        <p:attrNameLst>
+                                          <p:attrName>style.visibility</p:attrName>
+                                        </p:attrNameLst>
+                                      </p:cBhvr>
+                                      <p:to>
+                                        <p:strVal val="visible"/>
+                                      </p:to>
+                                    </p:set>
+                                    <p:animEffect transition="in" filter="wheel(1)">
+                                      <p:cBhvr>
+                                        <p:cTn id="36" dur="500"/>
+                                        <p:tgtEl>
                                           <p:spTgt spid="6"/>
                                         </p:tgtEl>
                                       </p:cBhvr>
@@ -22803,20 +23117,20 @@
                           </p:cTn>
                         </p:par>
                         <p:par>
-                          <p:cTn id="27" fill="hold">
+                          <p:cTn id="37" fill="hold">
                             <p:stCondLst>
                               <p:cond delay="500"/>
                             </p:stCondLst>
                             <p:childTnLst>
                               <p:par>
-                                <p:cTn id="28" presetID="21" presetClass="entr" presetSubtype="1" fill="hold" grpId="0" nodeType="afterEffect">
+                                <p:cTn id="38" presetID="21" presetClass="entr" presetSubtype="1" fill="hold" grpId="0" nodeType="afterEffect">
                                   <p:stCondLst>
                                     <p:cond delay="500"/>
                                   </p:stCondLst>
                                   <p:childTnLst>
                                     <p:set>
                                       <p:cBhvr>
-                                        <p:cTn id="29" dur="1" fill="hold">
+                                        <p:cTn id="39" dur="1" fill="hold">
                                           <p:stCondLst>
                                             <p:cond delay="0"/>
                                           </p:stCondLst>
@@ -22834,7 +23148,7 @@
                                     </p:set>
                                     <p:animEffect transition="in" filter="wheel(1)">
                                       <p:cBhvr>
-                                        <p:cTn id="30" dur="500"/>
+                                        <p:cTn id="40" dur="500"/>
                                         <p:tgtEl>
                                           <p:spTgt spid="9"/>
                                         </p:tgtEl>
@@ -22850,26 +23164,26 @@
                     </p:cTn>
                   </p:par>
                   <p:par>
-                    <p:cTn id="31" fill="hold">
+                    <p:cTn id="41" fill="hold">
                       <p:stCondLst>
                         <p:cond delay="indefinite"/>
                       </p:stCondLst>
                       <p:childTnLst>
                         <p:par>
-                          <p:cTn id="32" fill="hold">
+                          <p:cTn id="42" fill="hold">
                             <p:stCondLst>
                               <p:cond delay="0"/>
                             </p:stCondLst>
                             <p:childTnLst>
                               <p:par>
-                                <p:cTn id="33" presetID="22" presetClass="entr" presetSubtype="8" fill="hold" grpId="0" nodeType="clickEffect">
+                                <p:cTn id="43" presetID="22" presetClass="entr" presetSubtype="8" fill="hold" grpId="0" nodeType="clickEffect">
                                   <p:stCondLst>
                                     <p:cond delay="0"/>
                                   </p:stCondLst>
                                   <p:childTnLst>
                                     <p:set>
                                       <p:cBhvr>
-                                        <p:cTn id="34" dur="1" fill="hold">
+                                        <p:cTn id="44" dur="1" fill="hold">
                                           <p:stCondLst>
                                             <p:cond delay="0"/>
                                           </p:stCondLst>
@@ -22891,7 +23205,7 @@
                                     </p:set>
                                     <p:animEffect transition="in" filter="wipe(left)">
                                       <p:cBhvr>
-                                        <p:cTn id="35" dur="500"/>
+                                        <p:cTn id="45" dur="500"/>
                                         <p:tgtEl>
                                           <p:spTgt spid="8">
                                             <p:txEl>
@@ -22935,6 +23249,8 @@
       <p:bldP spid="8" grpId="0" uiExpand="1" build="p"/>
       <p:bldP spid="6" grpId="0" animBg="1"/>
       <p:bldP spid="9" grpId="0" animBg="1"/>
+      <p:bldP spid="10" grpId="0" animBg="1"/>
+      <p:bldP spid="11" grpId="0" animBg="1"/>
     </p:bldLst>
   </p:timing>
 </p:sld>
@@ -24386,7 +24702,7 @@
         </p:nvSpPr>
         <p:spPr>
           <a:xfrm>
-            <a:off x="2438397" y="1175871"/>
+            <a:off x="935319" y="1483911"/>
             <a:ext cx="2378635" cy="1595718"/>
           </a:xfrm>
           <a:prstGeom prst="roundRect">
@@ -24484,14 +24800,14 @@
           <p:cNvCxnSpPr>
             <a:cxnSpLocks/>
             <a:stCxn id="7" idx="1"/>
-            <a:endCxn id="6" idx="3"/>
+            <a:endCxn id="17" idx="3"/>
           </p:cNvCxnSpPr>
           <p:nvPr/>
         </p:nvCxnSpPr>
         <p:spPr>
           <a:xfrm flipH="1">
-            <a:off x="4817032" y="1849718"/>
-            <a:ext cx="4061013" cy="124012"/>
+            <a:off x="7138892" y="1849718"/>
+            <a:ext cx="1739153" cy="40594"/>
           </a:xfrm>
           <a:prstGeom prst="straightConnector1">
             <a:avLst/>
@@ -24529,7 +24845,7 @@
         </p:nvSpPr>
         <p:spPr>
           <a:xfrm>
-            <a:off x="1526986" y="3683000"/>
+            <a:off x="2680444" y="4466319"/>
             <a:ext cx="2378635" cy="1928905"/>
           </a:xfrm>
           <a:prstGeom prst="roundRect">
@@ -24610,9 +24926,9 @@
           <p:nvPr/>
         </p:nvCxnSpPr>
         <p:spPr>
-          <a:xfrm flipH="1">
-            <a:off x="2716304" y="2771589"/>
-            <a:ext cx="911411" cy="911411"/>
+          <a:xfrm>
+            <a:off x="2124637" y="3079629"/>
+            <a:ext cx="1745125" cy="1386690"/>
           </a:xfrm>
           <a:prstGeom prst="straightConnector1">
             <a:avLst/>
@@ -24654,8 +24970,8 @@
         </p:nvCxnSpPr>
         <p:spPr>
           <a:xfrm flipV="1">
-            <a:off x="3905621" y="2647577"/>
-            <a:ext cx="6161742" cy="1999876"/>
+            <a:off x="5059079" y="2647577"/>
+            <a:ext cx="5008284" cy="2783195"/>
           </a:xfrm>
           <a:prstGeom prst="straightConnector1">
             <a:avLst/>
@@ -24743,7 +25059,7 @@
         </p:nvSpPr>
         <p:spPr>
           <a:xfrm>
-            <a:off x="7739532" y="5240366"/>
+            <a:off x="7739532" y="5228414"/>
             <a:ext cx="1532964" cy="506804"/>
           </a:xfrm>
           <a:prstGeom prst="rect">
@@ -24792,7 +25108,7 @@
         </p:nvSpPr>
         <p:spPr>
           <a:xfrm>
-            <a:off x="9271000" y="5240366"/>
+            <a:off x="9271000" y="5228414"/>
             <a:ext cx="1532964" cy="506804"/>
           </a:xfrm>
           <a:prstGeom prst="rect">
@@ -24827,6 +25143,99 @@
           </a:p>
         </p:txBody>
       </p:sp>
+      <p:sp>
+        <p:nvSpPr>
+          <p:cNvPr id="17" name="Rectangle: Rounded Corners 16">
+            <a:extLst>
+              <a:ext uri="{FF2B5EF4-FFF2-40B4-BE49-F238E27FC236}">
+                <a16:creationId xmlns:a16="http://schemas.microsoft.com/office/drawing/2014/main" id="{AEB2E52B-BCC1-4B97-95B5-730BA86E53C6}"/>
+              </a:ext>
+            </a:extLst>
+          </p:cNvPr>
+          <p:cNvSpPr/>
+          <p:nvPr/>
+        </p:nvSpPr>
+        <p:spPr>
+          <a:xfrm>
+            <a:off x="4760257" y="1092453"/>
+            <a:ext cx="2378635" cy="1595718"/>
+          </a:xfrm>
+          <a:prstGeom prst="roundRect">
+            <a:avLst/>
+          </a:prstGeom>
+        </p:spPr>
+        <p:style>
+          <a:lnRef idx="2">
+            <a:schemeClr val="accent1">
+              <a:shade val="50000"/>
+            </a:schemeClr>
+          </a:lnRef>
+          <a:fillRef idx="1">
+            <a:schemeClr val="accent1"/>
+          </a:fillRef>
+          <a:effectRef idx="0">
+            <a:schemeClr val="accent1"/>
+          </a:effectRef>
+          <a:fontRef idx="minor">
+            <a:schemeClr val="lt1"/>
+          </a:fontRef>
+        </p:style>
+        <p:txBody>
+          <a:bodyPr rtlCol="0" anchor="ctr"/>
+          <a:lstStyle/>
+          <a:p>
+            <a:pPr algn="ctr"/>
+            <a:r>
+              <a:rPr lang="en-US" dirty="0"/>
+              <a:t>Site Script</a:t>
+            </a:r>
+            <a:endParaRPr lang="en-ZA" dirty="0"/>
+          </a:p>
+        </p:txBody>
+      </p:sp>
+      <p:cxnSp>
+        <p:nvCxnSpPr>
+          <p:cNvPr id="20" name="Straight Arrow Connector 19">
+            <a:extLst>
+              <a:ext uri="{FF2B5EF4-FFF2-40B4-BE49-F238E27FC236}">
+                <a16:creationId xmlns:a16="http://schemas.microsoft.com/office/drawing/2014/main" id="{33D54379-D886-42B1-AA80-A7C51007EA38}"/>
+              </a:ext>
+            </a:extLst>
+          </p:cNvPr>
+          <p:cNvCxnSpPr>
+            <a:cxnSpLocks/>
+            <a:stCxn id="17" idx="1"/>
+            <a:endCxn id="6" idx="3"/>
+          </p:cNvCxnSpPr>
+          <p:nvPr/>
+        </p:nvCxnSpPr>
+        <p:spPr>
+          <a:xfrm flipH="1">
+            <a:off x="3313954" y="1890312"/>
+            <a:ext cx="1446303" cy="391458"/>
+          </a:xfrm>
+          <a:prstGeom prst="straightConnector1">
+            <a:avLst/>
+          </a:prstGeom>
+          <a:ln w="57150">
+            <a:tailEnd type="triangle"/>
+          </a:ln>
+        </p:spPr>
+        <p:style>
+          <a:lnRef idx="3">
+            <a:schemeClr val="accent6"/>
+          </a:lnRef>
+          <a:fillRef idx="0">
+            <a:schemeClr val="accent6"/>
+          </a:fillRef>
+          <a:effectRef idx="2">
+            <a:schemeClr val="accent6"/>
+          </a:effectRef>
+          <a:fontRef idx="minor">
+            <a:schemeClr val="tx1"/>
+          </a:fontRef>
+        </p:style>
+      </p:cxnSp>
     </p:spTree>
     <p:extLst>
       <p:ext uri="{BB962C8B-B14F-4D97-AF65-F5344CB8AC3E}">
@@ -24874,7 +25283,7 @@
                                           </p:stCondLst>
                                         </p:cTn>
                                         <p:tgtEl>
-                                          <p:spTgt spid="7"/>
+                                          <p:spTgt spid="17"/>
                                         </p:tgtEl>
                                         <p:attrNameLst>
                                           <p:attrName>style.visibility</p:attrName>
@@ -24910,6 +25319,42 @@
                                           </p:stCondLst>
                                         </p:cTn>
                                         <p:tgtEl>
+                                          <p:spTgt spid="7"/>
+                                        </p:tgtEl>
+                                        <p:attrNameLst>
+                                          <p:attrName>style.visibility</p:attrName>
+                                        </p:attrNameLst>
+                                      </p:cBhvr>
+                                      <p:to>
+                                        <p:strVal val="visible"/>
+                                      </p:to>
+                                    </p:set>
+                                  </p:childTnLst>
+                                </p:cTn>
+                              </p:par>
+                            </p:childTnLst>
+                          </p:cTn>
+                        </p:par>
+                        <p:par>
+                          <p:cTn id="10" fill="hold">
+                            <p:stCondLst>
+                              <p:cond delay="0"/>
+                            </p:stCondLst>
+                            <p:childTnLst>
+                              <p:par>
+                                <p:cTn id="11" presetID="1" presetClass="entr" presetSubtype="0" fill="hold" grpId="0" nodeType="afterEffect">
+                                  <p:stCondLst>
+                                    <p:cond delay="0"/>
+                                  </p:stCondLst>
+                                  <p:childTnLst>
+                                    <p:set>
+                                      <p:cBhvr>
+                                        <p:cTn id="12" dur="1" fill="hold">
+                                          <p:stCondLst>
+                                            <p:cond delay="0"/>
+                                          </p:stCondLst>
+                                        </p:cTn>
+                                        <p:tgtEl>
                                           <p:spTgt spid="6"/>
                                         </p:tgtEl>
                                         <p:attrNameLst>
@@ -24930,26 +25375,26 @@
                     </p:cTn>
                   </p:par>
                   <p:par>
-                    <p:cTn id="10" fill="hold">
+                    <p:cTn id="13" fill="hold">
                       <p:stCondLst>
                         <p:cond delay="indefinite"/>
                       </p:stCondLst>
                       <p:childTnLst>
                         <p:par>
-                          <p:cTn id="11" fill="hold">
+                          <p:cTn id="14" fill="hold">
                             <p:stCondLst>
                               <p:cond delay="0"/>
                             </p:stCondLst>
                             <p:childTnLst>
                               <p:par>
-                                <p:cTn id="12" presetID="22" presetClass="entr" presetSubtype="2" fill="hold" nodeType="clickEffect">
+                                <p:cTn id="15" presetID="22" presetClass="entr" presetSubtype="2" fill="hold" nodeType="clickEffect">
                                   <p:stCondLst>
                                     <p:cond delay="0"/>
                                   </p:stCondLst>
                                   <p:childTnLst>
                                     <p:set>
                                       <p:cBhvr>
-                                        <p:cTn id="13" dur="1" fill="hold">
+                                        <p:cTn id="16" dur="1" fill="hold">
                                           <p:stCondLst>
                                             <p:cond delay="0"/>
                                           </p:stCondLst>
@@ -24967,7 +25412,7 @@
                                     </p:set>
                                     <p:animEffect transition="in" filter="wipe(right)">
                                       <p:cBhvr>
-                                        <p:cTn id="14" dur="250"/>
+                                        <p:cTn id="17" dur="250"/>
                                         <p:tgtEl>
                                           <p:spTgt spid="8"/>
                                         </p:tgtEl>
@@ -24983,26 +25428,79 @@
                     </p:cTn>
                   </p:par>
                   <p:par>
-                    <p:cTn id="15" fill="hold">
+                    <p:cTn id="18" fill="hold">
                       <p:stCondLst>
                         <p:cond delay="indefinite"/>
                       </p:stCondLst>
                       <p:childTnLst>
                         <p:par>
-                          <p:cTn id="16" fill="hold">
+                          <p:cTn id="19" fill="hold">
                             <p:stCondLst>
                               <p:cond delay="0"/>
                             </p:stCondLst>
                             <p:childTnLst>
                               <p:par>
-                                <p:cTn id="17" presetID="22" presetClass="entr" presetSubtype="1" fill="hold" nodeType="clickEffect">
+                                <p:cTn id="20" presetID="22" presetClass="entr" presetSubtype="2" fill="hold" nodeType="clickEffect">
                                   <p:stCondLst>
                                     <p:cond delay="0"/>
                                   </p:stCondLst>
                                   <p:childTnLst>
                                     <p:set>
                                       <p:cBhvr>
-                                        <p:cTn id="18" dur="1" fill="hold">
+                                        <p:cTn id="21" dur="1" fill="hold">
+                                          <p:stCondLst>
+                                            <p:cond delay="0"/>
+                                          </p:stCondLst>
+                                        </p:cTn>
+                                        <p:tgtEl>
+                                          <p:spTgt spid="20"/>
+                                        </p:tgtEl>
+                                        <p:attrNameLst>
+                                          <p:attrName>style.visibility</p:attrName>
+                                        </p:attrNameLst>
+                                      </p:cBhvr>
+                                      <p:to>
+                                        <p:strVal val="visible"/>
+                                      </p:to>
+                                    </p:set>
+                                    <p:animEffect transition="in" filter="wipe(right)">
+                                      <p:cBhvr>
+                                        <p:cTn id="22" dur="250"/>
+                                        <p:tgtEl>
+                                          <p:spTgt spid="20"/>
+                                        </p:tgtEl>
+                                      </p:cBhvr>
+                                    </p:animEffect>
+                                  </p:childTnLst>
+                                </p:cTn>
+                              </p:par>
+                            </p:childTnLst>
+                          </p:cTn>
+                        </p:par>
+                      </p:childTnLst>
+                    </p:cTn>
+                  </p:par>
+                  <p:par>
+                    <p:cTn id="23" fill="hold">
+                      <p:stCondLst>
+                        <p:cond delay="indefinite"/>
+                      </p:stCondLst>
+                      <p:childTnLst>
+                        <p:par>
+                          <p:cTn id="24" fill="hold">
+                            <p:stCondLst>
+                              <p:cond delay="0"/>
+                            </p:stCondLst>
+                            <p:childTnLst>
+                              <p:par>
+                                <p:cTn id="25" presetID="22" presetClass="entr" presetSubtype="1" fill="hold" nodeType="clickEffect">
+                                  <p:stCondLst>
+                                    <p:cond delay="0"/>
+                                  </p:stCondLst>
+                                  <p:childTnLst>
+                                    <p:set>
+                                      <p:cBhvr>
+                                        <p:cTn id="26" dur="1" fill="hold">
                                           <p:stCondLst>
                                             <p:cond delay="0"/>
                                           </p:stCondLst>
@@ -25020,7 +25518,7 @@
                                     </p:set>
                                     <p:animEffect transition="in" filter="wipe(up)">
                                       <p:cBhvr>
-                                        <p:cTn id="19" dur="250"/>
+                                        <p:cTn id="27" dur="250"/>
                                         <p:tgtEl>
                                           <p:spTgt spid="15"/>
                                         </p:tgtEl>
@@ -25033,20 +25531,20 @@
                           </p:cTn>
                         </p:par>
                         <p:par>
-                          <p:cTn id="20" fill="hold">
+                          <p:cTn id="28" fill="hold">
                             <p:stCondLst>
                               <p:cond delay="250"/>
                             </p:stCondLst>
                             <p:childTnLst>
                               <p:par>
-                                <p:cTn id="21" presetID="1" presetClass="entr" presetSubtype="0" fill="hold" grpId="0" nodeType="afterEffect">
+                                <p:cTn id="29" presetID="1" presetClass="entr" presetSubtype="0" fill="hold" grpId="0" nodeType="afterEffect">
                                   <p:stCondLst>
                                     <p:cond delay="0"/>
                                   </p:stCondLst>
                                   <p:childTnLst>
                                     <p:set>
                                       <p:cBhvr>
-                                        <p:cTn id="22" dur="1" fill="hold">
+                                        <p:cTn id="30" dur="1" fill="hold">
                                           <p:stCondLst>
                                             <p:cond delay="0"/>
                                           </p:stCondLst>
@@ -25072,26 +25570,26 @@
                     </p:cTn>
                   </p:par>
                   <p:par>
-                    <p:cTn id="23" fill="hold">
+                    <p:cTn id="31" fill="hold">
                       <p:stCondLst>
                         <p:cond delay="indefinite"/>
                       </p:stCondLst>
                       <p:childTnLst>
                         <p:par>
-                          <p:cTn id="24" fill="hold">
+                          <p:cTn id="32" fill="hold">
                             <p:stCondLst>
                               <p:cond delay="0"/>
                             </p:stCondLst>
                             <p:childTnLst>
                               <p:par>
-                                <p:cTn id="25" presetID="22" presetClass="entr" presetSubtype="8" fill="hold" nodeType="clickEffect">
+                                <p:cTn id="33" presetID="22" presetClass="entr" presetSubtype="8" fill="hold" nodeType="clickEffect">
                                   <p:stCondLst>
                                     <p:cond delay="0"/>
                                   </p:stCondLst>
                                   <p:childTnLst>
                                     <p:set>
                                       <p:cBhvr>
-                                        <p:cTn id="26" dur="1" fill="hold">
+                                        <p:cTn id="34" dur="1" fill="hold">
                                           <p:stCondLst>
                                             <p:cond delay="0"/>
                                           </p:stCondLst>
@@ -25109,7 +25607,7 @@
                                     </p:set>
                                     <p:animEffect transition="in" filter="wipe(left)">
                                       <p:cBhvr>
-                                        <p:cTn id="27" dur="250"/>
+                                        <p:cTn id="35" dur="250"/>
                                         <p:tgtEl>
                                           <p:spTgt spid="19"/>
                                         </p:tgtEl>
@@ -25125,26 +25623,26 @@
                     </p:cTn>
                   </p:par>
                   <p:par>
-                    <p:cTn id="28" fill="hold">
+                    <p:cTn id="36" fill="hold">
                       <p:stCondLst>
                         <p:cond delay="indefinite"/>
                       </p:stCondLst>
                       <p:childTnLst>
                         <p:par>
-                          <p:cTn id="29" fill="hold">
+                          <p:cTn id="37" fill="hold">
                             <p:stCondLst>
                               <p:cond delay="0"/>
                             </p:stCondLst>
                             <p:childTnLst>
                               <p:par>
-                                <p:cTn id="30" presetID="10" presetClass="entr" presetSubtype="0" fill="hold" grpId="0" nodeType="clickEffect">
+                                <p:cTn id="38" presetID="10" presetClass="entr" presetSubtype="0" fill="hold" grpId="0" nodeType="clickEffect">
                                   <p:stCondLst>
                                     <p:cond delay="0"/>
                                   </p:stCondLst>
                                   <p:childTnLst>
                                     <p:set>
                                       <p:cBhvr>
-                                        <p:cTn id="31" dur="1" fill="hold">
+                                        <p:cTn id="39" dur="1" fill="hold">
                                           <p:stCondLst>
                                             <p:cond delay="0"/>
                                           </p:stCondLst>
@@ -25162,7 +25660,7 @@
                                     </p:set>
                                     <p:animEffect transition="in" filter="fade">
                                       <p:cBhvr>
-                                        <p:cTn id="32" dur="500"/>
+                                        <p:cTn id="40" dur="500"/>
                                         <p:tgtEl>
                                           <p:spTgt spid="9"/>
                                         </p:tgtEl>
@@ -25178,26 +25676,26 @@
                     </p:cTn>
                   </p:par>
                   <p:par>
-                    <p:cTn id="33" fill="hold">
+                    <p:cTn id="41" fill="hold">
                       <p:stCondLst>
                         <p:cond delay="indefinite"/>
                       </p:stCondLst>
                       <p:childTnLst>
                         <p:par>
-                          <p:cTn id="34" fill="hold">
+                          <p:cTn id="42" fill="hold">
                             <p:stCondLst>
                               <p:cond delay="0"/>
                             </p:stCondLst>
                             <p:childTnLst>
                               <p:par>
-                                <p:cTn id="35" presetID="10" presetClass="entr" presetSubtype="0" fill="hold" grpId="0" nodeType="clickEffect">
+                                <p:cTn id="43" presetID="10" presetClass="entr" presetSubtype="0" fill="hold" grpId="0" nodeType="clickEffect">
                                   <p:stCondLst>
                                     <p:cond delay="0"/>
                                   </p:stCondLst>
                                   <p:childTnLst>
                                     <p:set>
                                       <p:cBhvr>
-                                        <p:cTn id="36" dur="1" fill="hold">
+                                        <p:cTn id="44" dur="1" fill="hold">
                                           <p:stCondLst>
                                             <p:cond delay="0"/>
                                           </p:stCondLst>
@@ -25215,7 +25713,7 @@
                                     </p:set>
                                     <p:animEffect transition="in" filter="fade">
                                       <p:cBhvr>
-                                        <p:cTn id="37" dur="500"/>
+                                        <p:cTn id="45" dur="500"/>
                                         <p:tgtEl>
                                           <p:spTgt spid="10"/>
                                         </p:tgtEl>
@@ -25231,26 +25729,26 @@
                     </p:cTn>
                   </p:par>
                   <p:par>
-                    <p:cTn id="38" fill="hold">
+                    <p:cTn id="46" fill="hold">
                       <p:stCondLst>
                         <p:cond delay="indefinite"/>
                       </p:stCondLst>
                       <p:childTnLst>
                         <p:par>
-                          <p:cTn id="39" fill="hold">
+                          <p:cTn id="47" fill="hold">
                             <p:stCondLst>
                               <p:cond delay="0"/>
                             </p:stCondLst>
                             <p:childTnLst>
                               <p:par>
-                                <p:cTn id="40" presetID="10" presetClass="entr" presetSubtype="0" fill="hold" grpId="0" nodeType="clickEffect">
+                                <p:cTn id="48" presetID="10" presetClass="entr" presetSubtype="0" fill="hold" grpId="0" nodeType="clickEffect">
                                   <p:stCondLst>
                                     <p:cond delay="0"/>
                                   </p:stCondLst>
                                   <p:childTnLst>
                                     <p:set>
                                       <p:cBhvr>
-                                        <p:cTn id="41" dur="1" fill="hold">
+                                        <p:cTn id="49" dur="1" fill="hold">
                                           <p:stCondLst>
                                             <p:cond delay="0"/>
                                           </p:stCondLst>
@@ -25268,7 +25766,7 @@
                                     </p:set>
                                     <p:animEffect transition="in" filter="fade">
                                       <p:cBhvr>
-                                        <p:cTn id="42" dur="500"/>
+                                        <p:cTn id="50" dur="500"/>
                                         <p:tgtEl>
                                           <p:spTgt spid="11"/>
                                         </p:tgtEl>
@@ -25311,6 +25809,7 @@
       <p:bldP spid="9" grpId="0" animBg="1"/>
       <p:bldP spid="10" grpId="0" animBg="1"/>
       <p:bldP spid="11" grpId="0" animBg="1"/>
+      <p:bldP spid="17" grpId="0" animBg="1"/>
     </p:bldLst>
   </p:timing>
 </p:sld>
@@ -25743,6 +26242,52 @@
           </a:fillRef>
           <a:effectRef idx="0">
             <a:schemeClr val="accent1"/>
+          </a:effectRef>
+          <a:fontRef idx="minor">
+            <a:schemeClr val="lt1"/>
+          </a:fontRef>
+        </p:style>
+        <p:txBody>
+          <a:bodyPr rtlCol="0" anchor="ctr"/>
+          <a:lstStyle/>
+          <a:p>
+            <a:pPr algn="ctr"/>
+            <a:endParaRPr lang="en-ZA"/>
+          </a:p>
+        </p:txBody>
+      </p:sp>
+      <p:sp>
+        <p:nvSpPr>
+          <p:cNvPr id="11" name="Plus Sign 10">
+            <a:extLst>
+              <a:ext uri="{FF2B5EF4-FFF2-40B4-BE49-F238E27FC236}">
+                <a16:creationId xmlns:a16="http://schemas.microsoft.com/office/drawing/2014/main" id="{055946BA-26C8-496E-A9B8-2CAF3D98F1B6}"/>
+              </a:ext>
+            </a:extLst>
+          </p:cNvPr>
+          <p:cNvSpPr/>
+          <p:nvPr/>
+        </p:nvSpPr>
+        <p:spPr>
+          <a:xfrm>
+            <a:off x="5355570" y="3378806"/>
+            <a:ext cx="1422074" cy="1359228"/>
+          </a:xfrm>
+          <a:prstGeom prst="mathPlus">
+            <a:avLst/>
+          </a:prstGeom>
+        </p:spPr>
+        <p:style>
+          <a:lnRef idx="2">
+            <a:schemeClr val="accent2">
+              <a:shade val="50000"/>
+            </a:schemeClr>
+          </a:lnRef>
+          <a:fillRef idx="1">
+            <a:schemeClr val="accent2"/>
+          </a:fillRef>
+          <a:effectRef idx="0">
+            <a:schemeClr val="accent2"/>
           </a:effectRef>
           <a:fontRef idx="minor">
             <a:schemeClr val="lt1"/>
@@ -26095,6 +26640,105 @@
                       </p:childTnLst>
                     </p:cTn>
                   </p:par>
+                  <p:par>
+                    <p:cTn id="32" fill="hold">
+                      <p:stCondLst>
+                        <p:cond delay="indefinite"/>
+                      </p:stCondLst>
+                      <p:childTnLst>
+                        <p:par>
+                          <p:cTn id="33" fill="hold">
+                            <p:stCondLst>
+                              <p:cond delay="0"/>
+                            </p:stCondLst>
+                            <p:childTnLst>
+                              <p:par>
+                                <p:cTn id="34" presetID="53" presetClass="entr" presetSubtype="16" fill="hold" grpId="0" nodeType="clickEffect">
+                                  <p:stCondLst>
+                                    <p:cond delay="0"/>
+                                  </p:stCondLst>
+                                  <p:childTnLst>
+                                    <p:set>
+                                      <p:cBhvr>
+                                        <p:cTn id="35" dur="1" fill="hold">
+                                          <p:stCondLst>
+                                            <p:cond delay="0"/>
+                                          </p:stCondLst>
+                                        </p:cTn>
+                                        <p:tgtEl>
+                                          <p:spTgt spid="11"/>
+                                        </p:tgtEl>
+                                        <p:attrNameLst>
+                                          <p:attrName>style.visibility</p:attrName>
+                                        </p:attrNameLst>
+                                      </p:cBhvr>
+                                      <p:to>
+                                        <p:strVal val="visible"/>
+                                      </p:to>
+                                    </p:set>
+                                    <p:anim calcmode="lin" valueType="num">
+                                      <p:cBhvr>
+                                        <p:cTn id="36" dur="500" fill="hold"/>
+                                        <p:tgtEl>
+                                          <p:spTgt spid="11"/>
+                                        </p:tgtEl>
+                                        <p:attrNameLst>
+                                          <p:attrName>ppt_w</p:attrName>
+                                        </p:attrNameLst>
+                                      </p:cBhvr>
+                                      <p:tavLst>
+                                        <p:tav tm="0">
+                                          <p:val>
+                                            <p:fltVal val="0"/>
+                                          </p:val>
+                                        </p:tav>
+                                        <p:tav tm="100000">
+                                          <p:val>
+                                            <p:strVal val="#ppt_w"/>
+                                          </p:val>
+                                        </p:tav>
+                                      </p:tavLst>
+                                    </p:anim>
+                                    <p:anim calcmode="lin" valueType="num">
+                                      <p:cBhvr>
+                                        <p:cTn id="37" dur="500" fill="hold"/>
+                                        <p:tgtEl>
+                                          <p:spTgt spid="11"/>
+                                        </p:tgtEl>
+                                        <p:attrNameLst>
+                                          <p:attrName>ppt_h</p:attrName>
+                                        </p:attrNameLst>
+                                      </p:cBhvr>
+                                      <p:tavLst>
+                                        <p:tav tm="0">
+                                          <p:val>
+                                            <p:fltVal val="0"/>
+                                          </p:val>
+                                        </p:tav>
+                                        <p:tav tm="100000">
+                                          <p:val>
+                                            <p:strVal val="#ppt_h"/>
+                                          </p:val>
+                                        </p:tav>
+                                      </p:tavLst>
+                                    </p:anim>
+                                    <p:animEffect transition="in" filter="fade">
+                                      <p:cBhvr>
+                                        <p:cTn id="38" dur="500"/>
+                                        <p:tgtEl>
+                                          <p:spTgt spid="11"/>
+                                        </p:tgtEl>
+                                      </p:cBhvr>
+                                    </p:animEffect>
+                                  </p:childTnLst>
+                                </p:cTn>
+                              </p:par>
+                            </p:childTnLst>
+                          </p:cTn>
+                        </p:par>
+                      </p:childTnLst>
+                    </p:cTn>
+                  </p:par>
                 </p:childTnLst>
               </p:cTn>
               <p:prevCondLst>
@@ -26124,13 +26768,14 @@
       <p:bldP spid="9" grpId="0" animBg="1"/>
       <p:bldP spid="10" grpId="0" animBg="1"/>
       <p:bldP spid="12" grpId="0" animBg="1"/>
+      <p:bldP spid="11" grpId="0" animBg="1"/>
     </p:bldLst>
   </p:timing>
 </p:sld>
 </file>
 
 <file path=ppt/slides/slide27.xml><?xml version="1.0" encoding="utf-8"?>
-<p:sld xmlns:a="http://schemas.openxmlformats.org/drawingml/2006/main" xmlns:r="http://schemas.openxmlformats.org/officeDocument/2006/relationships" xmlns:p="http://schemas.openxmlformats.org/presentationml/2006/main">
+<p:sld xmlns:a="http://schemas.openxmlformats.org/drawingml/2006/main" xmlns:r="http://schemas.openxmlformats.org/officeDocument/2006/relationships" xmlns:p="http://schemas.openxmlformats.org/presentationml/2006/main" show="0">
   <p:cSld>
     <p:spTree>
       <p:nvGrpSpPr>
@@ -26361,12 +27006,14 @@
         </p:nvSpPr>
         <p:spPr>
           <a:xfrm>
-            <a:off x="354106" y="213191"/>
-            <a:ext cx="10515600" cy="1325563"/>
+            <a:off x="121024" y="80997"/>
+            <a:ext cx="10515600" cy="683280"/>
           </a:xfrm>
         </p:spPr>
         <p:txBody>
-          <a:bodyPr/>
+          <a:bodyPr>
+            <a:normAutofit fontScale="90000"/>
+          </a:bodyPr>
           <a:lstStyle/>
           <a:p>
             <a:r>
@@ -26395,8 +27042,8 @@
         </p:nvSpPr>
         <p:spPr>
           <a:xfrm>
-            <a:off x="724647" y="1401295"/>
-            <a:ext cx="10515600" cy="5243513"/>
+            <a:off x="724647" y="860613"/>
+            <a:ext cx="10515600" cy="5784196"/>
           </a:xfrm>
         </p:spPr>
         <p:txBody>
@@ -26411,7 +27058,7 @@
               </a:lnSpc>
             </a:pPr>
             <a:r>
-              <a:rPr lang="en-US" sz="2400" dirty="0"/>
+              <a:rPr lang="en-US" dirty="0"/>
               <a:t>What should our site provisioning process be?</a:t>
             </a:r>
           </a:p>
@@ -26422,7 +27069,7 @@
               </a:lnSpc>
             </a:pPr>
             <a:r>
-              <a:rPr lang="en-US" sz="2400" dirty="0"/>
+              <a:rPr lang="en-US" dirty="0"/>
               <a:t>What do we do for “Sites” versus “Subsites”?</a:t>
             </a:r>
           </a:p>
@@ -26433,7 +27080,7 @@
               </a:lnSpc>
             </a:pPr>
             <a:r>
-              <a:rPr lang="en-US" sz="2400" dirty="0"/>
+              <a:rPr lang="en-US" dirty="0"/>
               <a:t>What about O365 Groups and O365 Teams?</a:t>
             </a:r>
           </a:p>
@@ -26444,7 +27091,7 @@
               </a:lnSpc>
             </a:pPr>
             <a:r>
-              <a:rPr lang="en-US" sz="2400" dirty="0"/>
+              <a:rPr lang="en-US" dirty="0"/>
               <a:t>Do we have / enforce Governance?</a:t>
             </a:r>
           </a:p>
@@ -26455,7 +27102,7 @@
               </a:lnSpc>
             </a:pPr>
             <a:r>
-              <a:rPr lang="en-US" sz="2400" dirty="0"/>
+              <a:rPr lang="en-US" dirty="0"/>
               <a:t>Do we have / enforce standard Branding?</a:t>
             </a:r>
           </a:p>
@@ -26466,7 +27113,7 @@
               </a:lnSpc>
             </a:pPr>
             <a:r>
-              <a:rPr lang="en-US" sz="2400" dirty="0"/>
+              <a:rPr lang="en-US" dirty="0"/>
               <a:t>Do we allow Customizations?</a:t>
             </a:r>
           </a:p>
@@ -26477,7 +27124,7 @@
               </a:lnSpc>
             </a:pPr>
             <a:r>
-              <a:rPr lang="en-US" sz="2000" dirty="0"/>
+              <a:rPr lang="en-US" dirty="0"/>
               <a:t>How do we control them?</a:t>
             </a:r>
           </a:p>
@@ -26488,7 +27135,7 @@
               </a:lnSpc>
             </a:pPr>
             <a:r>
-              <a:rPr lang="en-US" sz="2400" dirty="0"/>
+              <a:rPr lang="en-US" dirty="0"/>
               <a:t>Do we need Approvals for site requests?</a:t>
             </a:r>
           </a:p>
@@ -26499,7 +27146,7 @@
               </a:lnSpc>
             </a:pPr>
             <a:r>
-              <a:rPr lang="en-US" sz="2400" dirty="0"/>
+              <a:rPr lang="en-US" dirty="0"/>
               <a:t>How do we deal with Updates?</a:t>
             </a:r>
           </a:p>
@@ -26510,7 +27157,7 @@
               </a:lnSpc>
             </a:pPr>
             <a:r>
-              <a:rPr lang="en-US" sz="2400" dirty="0"/>
+              <a:rPr lang="en-US" dirty="0"/>
               <a:t>What skills do we have? What skills do we need?</a:t>
             </a:r>
           </a:p>
@@ -26521,7 +27168,7 @@
               </a:lnSpc>
             </a:pPr>
             <a:r>
-              <a:rPr lang="en-US" sz="2400" dirty="0"/>
+              <a:rPr lang="en-US" dirty="0"/>
               <a:t>What about Classic versus Modern Sites in O365?</a:t>
             </a:r>
           </a:p>
@@ -26531,10 +27178,53 @@
                 <a:spcPct val="100000"/>
               </a:lnSpc>
             </a:pPr>
-            <a:endParaRPr lang="en-US" sz="2400" dirty="0"/>
+            <a:endParaRPr lang="en-US" dirty="0"/>
           </a:p>
         </p:txBody>
       </p:sp>
+      <p:pic>
+        <p:nvPicPr>
+          <p:cNvPr id="5" name="Picture 4" descr="Screen Clipping">
+            <a:extLst>
+              <a:ext uri="{FF2B5EF4-FFF2-40B4-BE49-F238E27FC236}">
+                <a16:creationId xmlns:a16="http://schemas.microsoft.com/office/drawing/2014/main" id="{3EE9EED0-36BA-4A54-9D68-42F09ED5C544}"/>
+              </a:ext>
+            </a:extLst>
+          </p:cNvPr>
+          <p:cNvPicPr>
+            <a:picLocks noChangeAspect="1"/>
+          </p:cNvPicPr>
+          <p:nvPr/>
+        </p:nvPicPr>
+        <p:blipFill>
+          <a:blip r:embed="rId3">
+            <a:extLst>
+              <a:ext uri="{28A0092B-C50C-407E-A947-70E740481C1C}">
+                <a14:useLocalDpi xmlns:a14="http://schemas.microsoft.com/office/drawing/2010/main" val="0"/>
+              </a:ext>
+            </a:extLst>
+          </a:blip>
+          <a:stretch>
+            <a:fillRect/>
+          </a:stretch>
+        </p:blipFill>
+        <p:spPr>
+          <a:xfrm>
+            <a:off x="2050469" y="2247152"/>
+            <a:ext cx="8091062" cy="3846571"/>
+          </a:xfrm>
+          <a:prstGeom prst="rect">
+            <a:avLst/>
+          </a:prstGeom>
+          <a:effectLst>
+            <a:outerShdw blurRad="50800" dist="38100" dir="5400000" algn="t" rotWithShape="0">
+              <a:prstClr val="black">
+                <a:alpha val="40000"/>
+              </a:prstClr>
+            </a:outerShdw>
+          </a:effectLst>
+        </p:spPr>
+      </p:pic>
     </p:spTree>
     <p:extLst>
       <p:ext uri="{BB962C8B-B14F-4D97-AF65-F5344CB8AC3E}">
@@ -26630,7 +27320,7 @@
                             </p:stCondLst>
                             <p:childTnLst>
                               <p:par>
-                                <p:cTn id="10" presetID="22" presetClass="entr" presetSubtype="8" fill="hold" grpId="0" nodeType="clickEffect">
+                                <p:cTn id="10" presetID="10" presetClass="entr" presetSubtype="0" fill="hold" nodeType="clickEffect">
                                   <p:stCondLst>
                                     <p:cond delay="0"/>
                                   </p:stCondLst>
@@ -26643,11 +27333,7 @@
                                           </p:stCondLst>
                                         </p:cTn>
                                         <p:tgtEl>
-                                          <p:spTgt spid="3">
-                                            <p:txEl>
-                                              <p:pRg st="1" end="1"/>
-                                            </p:txEl>
-                                          </p:spTgt>
+                                          <p:spTgt spid="5"/>
                                         </p:tgtEl>
                                         <p:attrNameLst>
                                           <p:attrName>style.visibility</p:attrName>
@@ -26657,15 +27343,11 @@
                                         <p:strVal val="visible"/>
                                       </p:to>
                                     </p:set>
-                                    <p:animEffect transition="in" filter="wipe(left)">
+                                    <p:animEffect transition="in" filter="fade">
                                       <p:cBhvr>
                                         <p:cTn id="12" dur="500"/>
                                         <p:tgtEl>
-                                          <p:spTgt spid="3">
-                                            <p:txEl>
-                                              <p:pRg st="1" end="1"/>
-                                            </p:txEl>
-                                          </p:spTgt>
+                                          <p:spTgt spid="5"/>
                                         </p:tgtEl>
                                       </p:cBhvr>
                                     </p:animEffect>
@@ -26691,14 +27373,119 @@
                             </p:stCondLst>
                             <p:childTnLst>
                               <p:par>
-                                <p:cTn id="15" presetID="22" presetClass="entr" presetSubtype="8" fill="hold" grpId="0" nodeType="clickEffect">
+                                <p:cTn id="15" presetID="10" presetClass="exit" presetSubtype="0" fill="hold" nodeType="clickEffect">
+                                  <p:stCondLst>
+                                    <p:cond delay="0"/>
+                                  </p:stCondLst>
+                                  <p:childTnLst>
+                                    <p:animEffect transition="out" filter="fade">
+                                      <p:cBhvr>
+                                        <p:cTn id="16" dur="500"/>
+                                        <p:tgtEl>
+                                          <p:spTgt spid="5"/>
+                                        </p:tgtEl>
+                                      </p:cBhvr>
+                                    </p:animEffect>
+                                    <p:set>
+                                      <p:cBhvr>
+                                        <p:cTn id="17" dur="1" fill="hold">
+                                          <p:stCondLst>
+                                            <p:cond delay="499"/>
+                                          </p:stCondLst>
+                                        </p:cTn>
+                                        <p:tgtEl>
+                                          <p:spTgt spid="5"/>
+                                        </p:tgtEl>
+                                        <p:attrNameLst>
+                                          <p:attrName>style.visibility</p:attrName>
+                                        </p:attrNameLst>
+                                      </p:cBhvr>
+                                      <p:to>
+                                        <p:strVal val="hidden"/>
+                                      </p:to>
+                                    </p:set>
+                                  </p:childTnLst>
+                                </p:cTn>
+                              </p:par>
+                            </p:childTnLst>
+                          </p:cTn>
+                        </p:par>
+                        <p:par>
+                          <p:cTn id="18" fill="hold">
+                            <p:stCondLst>
+                              <p:cond delay="500"/>
+                            </p:stCondLst>
+                            <p:childTnLst>
+                              <p:par>
+                                <p:cTn id="19" presetID="22" presetClass="entr" presetSubtype="8" fill="hold" grpId="0" nodeType="afterEffect">
                                   <p:stCondLst>
                                     <p:cond delay="0"/>
                                   </p:stCondLst>
                                   <p:childTnLst>
                                     <p:set>
                                       <p:cBhvr>
-                                        <p:cTn id="16" dur="1" fill="hold">
+                                        <p:cTn id="20" dur="1" fill="hold">
+                                          <p:stCondLst>
+                                            <p:cond delay="0"/>
+                                          </p:stCondLst>
+                                        </p:cTn>
+                                        <p:tgtEl>
+                                          <p:spTgt spid="3">
+                                            <p:txEl>
+                                              <p:pRg st="1" end="1"/>
+                                            </p:txEl>
+                                          </p:spTgt>
+                                        </p:tgtEl>
+                                        <p:attrNameLst>
+                                          <p:attrName>style.visibility</p:attrName>
+                                        </p:attrNameLst>
+                                      </p:cBhvr>
+                                      <p:to>
+                                        <p:strVal val="visible"/>
+                                      </p:to>
+                                    </p:set>
+                                    <p:animEffect transition="in" filter="wipe(left)">
+                                      <p:cBhvr>
+                                        <p:cTn id="21" dur="500"/>
+                                        <p:tgtEl>
+                                          <p:spTgt spid="3">
+                                            <p:txEl>
+                                              <p:pRg st="1" end="1"/>
+                                            </p:txEl>
+                                          </p:spTgt>
+                                        </p:tgtEl>
+                                      </p:cBhvr>
+                                    </p:animEffect>
+                                  </p:childTnLst>
+                                </p:cTn>
+                              </p:par>
+                            </p:childTnLst>
+                          </p:cTn>
+                        </p:par>
+                      </p:childTnLst>
+                    </p:cTn>
+                  </p:par>
+                  <p:par>
+                    <p:cTn id="22" fill="hold">
+                      <p:stCondLst>
+                        <p:cond delay="indefinite"/>
+                      </p:stCondLst>
+                      <p:childTnLst>
+                        <p:par>
+                          <p:cTn id="23" fill="hold">
+                            <p:stCondLst>
+                              <p:cond delay="0"/>
+                            </p:stCondLst>
+                            <p:childTnLst>
+                              <p:par>
+                                <p:cTn id="24" presetID="22" presetClass="entr" presetSubtype="8" fill="hold" grpId="0" nodeType="clickEffect">
+                                  <p:stCondLst>
+                                    <p:cond delay="0"/>
+                                  </p:stCondLst>
+                                  <p:childTnLst>
+                                    <p:set>
+                                      <p:cBhvr>
+                                        <p:cTn id="25" dur="1" fill="hold">
                                           <p:stCondLst>
                                             <p:cond delay="0"/>
                                           </p:stCondLst>
@@ -26720,7 +27507,7 @@
                                     </p:set>
                                     <p:animEffect transition="in" filter="wipe(left)">
                                       <p:cBhvr>
-                                        <p:cTn id="17" dur="500"/>
+                                        <p:cTn id="26" dur="500"/>
                                         <p:tgtEl>
                                           <p:spTgt spid="3">
                                             <p:txEl>
@@ -26740,26 +27527,26 @@
                     </p:cTn>
                   </p:par>
                   <p:par>
-                    <p:cTn id="18" fill="hold">
+                    <p:cTn id="27" fill="hold">
                       <p:stCondLst>
                         <p:cond delay="indefinite"/>
                       </p:stCondLst>
                       <p:childTnLst>
                         <p:par>
-                          <p:cTn id="19" fill="hold">
+                          <p:cTn id="28" fill="hold">
                             <p:stCondLst>
                               <p:cond delay="0"/>
                             </p:stCondLst>
                             <p:childTnLst>
                               <p:par>
-                                <p:cTn id="20" presetID="22" presetClass="entr" presetSubtype="8" fill="hold" grpId="0" nodeType="clickEffect">
+                                <p:cTn id="29" presetID="22" presetClass="entr" presetSubtype="8" fill="hold" grpId="0" nodeType="clickEffect">
                                   <p:stCondLst>
                                     <p:cond delay="0"/>
                                   </p:stCondLst>
                                   <p:childTnLst>
                                     <p:set>
                                       <p:cBhvr>
-                                        <p:cTn id="21" dur="1" fill="hold">
+                                        <p:cTn id="30" dur="1" fill="hold">
                                           <p:stCondLst>
                                             <p:cond delay="0"/>
                                           </p:stCondLst>
@@ -26781,7 +27568,7 @@
                                     </p:set>
                                     <p:animEffect transition="in" filter="wipe(left)">
                                       <p:cBhvr>
-                                        <p:cTn id="22" dur="500"/>
+                                        <p:cTn id="31" dur="500"/>
                                         <p:tgtEl>
                                           <p:spTgt spid="3">
                                             <p:txEl>
@@ -26801,26 +27588,26 @@
                     </p:cTn>
                   </p:par>
                   <p:par>
-                    <p:cTn id="23" fill="hold">
+                    <p:cTn id="32" fill="hold">
                       <p:stCondLst>
                         <p:cond delay="indefinite"/>
                       </p:stCondLst>
                       <p:childTnLst>
                         <p:par>
-                          <p:cTn id="24" fill="hold">
+                          <p:cTn id="33" fill="hold">
                             <p:stCondLst>
                               <p:cond delay="0"/>
                             </p:stCondLst>
                             <p:childTnLst>
                               <p:par>
-                                <p:cTn id="25" presetID="22" presetClass="entr" presetSubtype="8" fill="hold" grpId="0" nodeType="clickEffect">
+                                <p:cTn id="34" presetID="22" presetClass="entr" presetSubtype="8" fill="hold" grpId="0" nodeType="clickEffect">
                                   <p:stCondLst>
                                     <p:cond delay="0"/>
                                   </p:stCondLst>
                                   <p:childTnLst>
                                     <p:set>
                                       <p:cBhvr>
-                                        <p:cTn id="26" dur="1" fill="hold">
+                                        <p:cTn id="35" dur="1" fill="hold">
                                           <p:stCondLst>
                                             <p:cond delay="0"/>
                                           </p:stCondLst>
@@ -26842,7 +27629,7 @@
                                     </p:set>
                                     <p:animEffect transition="in" filter="wipe(left)">
                                       <p:cBhvr>
-                                        <p:cTn id="27" dur="500"/>
+                                        <p:cTn id="36" dur="500"/>
                                         <p:tgtEl>
                                           <p:spTgt spid="3">
                                             <p:txEl>
@@ -26862,26 +27649,26 @@
                     </p:cTn>
                   </p:par>
                   <p:par>
-                    <p:cTn id="28" fill="hold">
+                    <p:cTn id="37" fill="hold">
                       <p:stCondLst>
                         <p:cond delay="indefinite"/>
                       </p:stCondLst>
                       <p:childTnLst>
                         <p:par>
-                          <p:cTn id="29" fill="hold">
+                          <p:cTn id="38" fill="hold">
                             <p:stCondLst>
                               <p:cond delay="0"/>
                             </p:stCondLst>
                             <p:childTnLst>
                               <p:par>
-                                <p:cTn id="30" presetID="22" presetClass="entr" presetSubtype="8" fill="hold" grpId="0" nodeType="clickEffect">
+                                <p:cTn id="39" presetID="22" presetClass="entr" presetSubtype="8" fill="hold" grpId="0" nodeType="clickEffect">
                                   <p:stCondLst>
                                     <p:cond delay="0"/>
                                   </p:stCondLst>
                                   <p:childTnLst>
                                     <p:set>
                                       <p:cBhvr>
-                                        <p:cTn id="31" dur="1" fill="hold">
+                                        <p:cTn id="40" dur="1" fill="hold">
                                           <p:stCondLst>
                                             <p:cond delay="0"/>
                                           </p:stCondLst>
@@ -26903,7 +27690,7 @@
                                     </p:set>
                                     <p:animEffect transition="in" filter="wipe(left)">
                                       <p:cBhvr>
-                                        <p:cTn id="32" dur="500"/>
+                                        <p:cTn id="41" dur="500"/>
                                         <p:tgtEl>
                                           <p:spTgt spid="3">
                                             <p:txEl>
@@ -26923,26 +27710,26 @@
                     </p:cTn>
                   </p:par>
                   <p:par>
-                    <p:cTn id="33" fill="hold">
+                    <p:cTn id="42" fill="hold">
                       <p:stCondLst>
                         <p:cond delay="indefinite"/>
                       </p:stCondLst>
                       <p:childTnLst>
                         <p:par>
-                          <p:cTn id="34" fill="hold">
+                          <p:cTn id="43" fill="hold">
                             <p:stCondLst>
                               <p:cond delay="0"/>
                             </p:stCondLst>
                             <p:childTnLst>
                               <p:par>
-                                <p:cTn id="35" presetID="22" presetClass="entr" presetSubtype="8" fill="hold" grpId="0" nodeType="clickEffect">
+                                <p:cTn id="44" presetID="22" presetClass="entr" presetSubtype="8" fill="hold" grpId="0" nodeType="clickEffect">
                                   <p:stCondLst>
                                     <p:cond delay="0"/>
                                   </p:stCondLst>
                                   <p:childTnLst>
                                     <p:set>
                                       <p:cBhvr>
-                                        <p:cTn id="36" dur="1" fill="hold">
+                                        <p:cTn id="45" dur="1" fill="hold">
                                           <p:stCondLst>
                                             <p:cond delay="0"/>
                                           </p:stCondLst>
@@ -26964,7 +27751,7 @@
                                     </p:set>
                                     <p:animEffect transition="in" filter="wipe(left)">
                                       <p:cBhvr>
-                                        <p:cTn id="37" dur="500"/>
+                                        <p:cTn id="46" dur="500"/>
                                         <p:tgtEl>
                                           <p:spTgt spid="3">
                                             <p:txEl>
@@ -26984,26 +27771,26 @@
                     </p:cTn>
                   </p:par>
                   <p:par>
-                    <p:cTn id="38" fill="hold">
+                    <p:cTn id="47" fill="hold">
                       <p:stCondLst>
                         <p:cond delay="indefinite"/>
                       </p:stCondLst>
                       <p:childTnLst>
                         <p:par>
-                          <p:cTn id="39" fill="hold">
+                          <p:cTn id="48" fill="hold">
                             <p:stCondLst>
                               <p:cond delay="0"/>
                             </p:stCondLst>
                             <p:childTnLst>
                               <p:par>
-                                <p:cTn id="40" presetID="22" presetClass="entr" presetSubtype="8" fill="hold" grpId="0" nodeType="clickEffect">
+                                <p:cTn id="49" presetID="22" presetClass="entr" presetSubtype="8" fill="hold" grpId="0" nodeType="clickEffect">
                                   <p:stCondLst>
                                     <p:cond delay="0"/>
                                   </p:stCondLst>
                                   <p:childTnLst>
                                     <p:set>
                                       <p:cBhvr>
-                                        <p:cTn id="41" dur="1" fill="hold">
+                                        <p:cTn id="50" dur="1" fill="hold">
                                           <p:stCondLst>
                                             <p:cond delay="0"/>
                                           </p:stCondLst>
@@ -27025,7 +27812,7 @@
                                     </p:set>
                                     <p:animEffect transition="in" filter="wipe(left)">
                                       <p:cBhvr>
-                                        <p:cTn id="42" dur="500"/>
+                                        <p:cTn id="51" dur="500"/>
                                         <p:tgtEl>
                                           <p:spTgt spid="3">
                                             <p:txEl>
@@ -27045,26 +27832,26 @@
                     </p:cTn>
                   </p:par>
                   <p:par>
-                    <p:cTn id="43" fill="hold">
+                    <p:cTn id="52" fill="hold">
                       <p:stCondLst>
                         <p:cond delay="indefinite"/>
                       </p:stCondLst>
                       <p:childTnLst>
                         <p:par>
-                          <p:cTn id="44" fill="hold">
+                          <p:cTn id="53" fill="hold">
                             <p:stCondLst>
                               <p:cond delay="0"/>
                             </p:stCondLst>
                             <p:childTnLst>
                               <p:par>
-                                <p:cTn id="45" presetID="22" presetClass="entr" presetSubtype="8" fill="hold" grpId="0" nodeType="clickEffect">
+                                <p:cTn id="54" presetID="22" presetClass="entr" presetSubtype="8" fill="hold" grpId="0" nodeType="clickEffect">
                                   <p:stCondLst>
                                     <p:cond delay="0"/>
                                   </p:stCondLst>
                                   <p:childTnLst>
                                     <p:set>
                                       <p:cBhvr>
-                                        <p:cTn id="46" dur="1" fill="hold">
+                                        <p:cTn id="55" dur="1" fill="hold">
                                           <p:stCondLst>
                                             <p:cond delay="0"/>
                                           </p:stCondLst>
@@ -27086,7 +27873,7 @@
                                     </p:set>
                                     <p:animEffect transition="in" filter="wipe(left)">
                                       <p:cBhvr>
-                                        <p:cTn id="47" dur="500"/>
+                                        <p:cTn id="56" dur="500"/>
                                         <p:tgtEl>
                                           <p:spTgt spid="3">
                                             <p:txEl>
@@ -27106,26 +27893,26 @@
                     </p:cTn>
                   </p:par>
                   <p:par>
-                    <p:cTn id="48" fill="hold">
+                    <p:cTn id="57" fill="hold">
                       <p:stCondLst>
                         <p:cond delay="indefinite"/>
                       </p:stCondLst>
                       <p:childTnLst>
                         <p:par>
-                          <p:cTn id="49" fill="hold">
+                          <p:cTn id="58" fill="hold">
                             <p:stCondLst>
                               <p:cond delay="0"/>
                             </p:stCondLst>
                             <p:childTnLst>
                               <p:par>
-                                <p:cTn id="50" presetID="22" presetClass="entr" presetSubtype="8" fill="hold" grpId="0" nodeType="clickEffect">
+                                <p:cTn id="59" presetID="22" presetClass="entr" presetSubtype="8" fill="hold" grpId="0" nodeType="clickEffect">
                                   <p:stCondLst>
                                     <p:cond delay="0"/>
                                   </p:stCondLst>
                                   <p:childTnLst>
                                     <p:set>
                                       <p:cBhvr>
-                                        <p:cTn id="51" dur="1" fill="hold">
+                                        <p:cTn id="60" dur="1" fill="hold">
                                           <p:stCondLst>
                                             <p:cond delay="0"/>
                                           </p:stCondLst>
@@ -27147,7 +27934,7 @@
                                     </p:set>
                                     <p:animEffect transition="in" filter="wipe(left)">
                                       <p:cBhvr>
-                                        <p:cTn id="52" dur="500"/>
+                                        <p:cTn id="61" dur="500"/>
                                         <p:tgtEl>
                                           <p:spTgt spid="3">
                                             <p:txEl>
@@ -27167,26 +27954,26 @@
                     </p:cTn>
                   </p:par>
                   <p:par>
-                    <p:cTn id="53" fill="hold">
+                    <p:cTn id="62" fill="hold">
                       <p:stCondLst>
                         <p:cond delay="indefinite"/>
                       </p:stCondLst>
                       <p:childTnLst>
                         <p:par>
-                          <p:cTn id="54" fill="hold">
+                          <p:cTn id="63" fill="hold">
                             <p:stCondLst>
                               <p:cond delay="0"/>
                             </p:stCondLst>
                             <p:childTnLst>
                               <p:par>
-                                <p:cTn id="55" presetID="22" presetClass="entr" presetSubtype="8" fill="hold" grpId="0" nodeType="clickEffect">
+                                <p:cTn id="64" presetID="22" presetClass="entr" presetSubtype="8" fill="hold" grpId="0" nodeType="clickEffect">
                                   <p:stCondLst>
                                     <p:cond delay="0"/>
                                   </p:stCondLst>
                                   <p:childTnLst>
                                     <p:set>
                                       <p:cBhvr>
-                                        <p:cTn id="56" dur="1" fill="hold">
+                                        <p:cTn id="65" dur="1" fill="hold">
                                           <p:stCondLst>
                                             <p:cond delay="0"/>
                                           </p:stCondLst>
@@ -27208,7 +27995,7 @@
                                     </p:set>
                                     <p:animEffect transition="in" filter="wipe(left)">
                                       <p:cBhvr>
-                                        <p:cTn id="57" dur="500"/>
+                                        <p:cTn id="66" dur="500"/>
                                         <p:tgtEl>
                                           <p:spTgt spid="3">
                                             <p:txEl>
@@ -28201,7 +28988,7 @@
 </file>
 
 <file path=ppt/slides/slide6.xml><?xml version="1.0" encoding="utf-8"?>
-<p:sld xmlns:a="http://schemas.openxmlformats.org/drawingml/2006/main" xmlns:r="http://schemas.openxmlformats.org/officeDocument/2006/relationships" xmlns:p="http://schemas.openxmlformats.org/presentationml/2006/main">
+<p:sld xmlns:a="http://schemas.openxmlformats.org/drawingml/2006/main" xmlns:r="http://schemas.openxmlformats.org/officeDocument/2006/relationships" xmlns:p="http://schemas.openxmlformats.org/presentationml/2006/main" show="0">
   <p:cSld>
     <p:spTree>
       <p:nvGrpSpPr>
@@ -28277,6 +29064,60 @@
           </a:graphicData>
         </a:graphic>
       </p:graphicFrame>
+      <p:sp>
+        <p:nvSpPr>
+          <p:cNvPr id="3" name="Isosceles Triangle 2">
+            <a:extLst>
+              <a:ext uri="{FF2B5EF4-FFF2-40B4-BE49-F238E27FC236}">
+                <a16:creationId xmlns:a16="http://schemas.microsoft.com/office/drawing/2014/main" id="{931D092B-0C4E-4F51-B5FD-01E9114334E7}"/>
+              </a:ext>
+            </a:extLst>
+          </p:cNvPr>
+          <p:cNvSpPr/>
+          <p:nvPr/>
+        </p:nvSpPr>
+        <p:spPr>
+          <a:xfrm>
+            <a:off x="5707529" y="3514164"/>
+            <a:ext cx="776942" cy="669365"/>
+          </a:xfrm>
+          <a:prstGeom prst="triangle">
+            <a:avLst/>
+          </a:prstGeom>
+          <a:solidFill>
+            <a:srgbClr val="C00000"/>
+          </a:solidFill>
+          <a:ln>
+            <a:solidFill>
+              <a:srgbClr val="FF0000"/>
+            </a:solidFill>
+          </a:ln>
+        </p:spPr>
+        <p:style>
+          <a:lnRef idx="2">
+            <a:schemeClr val="accent1">
+              <a:shade val="50000"/>
+            </a:schemeClr>
+          </a:lnRef>
+          <a:fillRef idx="1">
+            <a:schemeClr val="accent1"/>
+          </a:fillRef>
+          <a:effectRef idx="0">
+            <a:schemeClr val="accent1"/>
+          </a:effectRef>
+          <a:fontRef idx="minor">
+            <a:schemeClr val="lt1"/>
+          </a:fontRef>
+        </p:style>
+        <p:txBody>
+          <a:bodyPr rtlCol="0" anchor="ctr"/>
+          <a:lstStyle/>
+          <a:p>
+            <a:pPr algn="ctr"/>
+            <a:endParaRPr lang="en-ZA"/>
+          </a:p>
+        </p:txBody>
+      </p:sp>
     </p:spTree>
     <p:extLst>
       <p:ext uri="{BB962C8B-B14F-4D97-AF65-F5344CB8AC3E}">
@@ -28290,6 +29131,92 @@
   <p:transition spd="slow">
     <p:push/>
   </p:transition>
+  <p:timing>
+    <p:tnLst>
+      <p:par>
+        <p:cTn id="1" dur="indefinite" restart="never" nodeType="tmRoot">
+          <p:childTnLst>
+            <p:seq concurrent="1" nextAc="seek">
+              <p:cTn id="2" dur="indefinite" nodeType="mainSeq">
+                <p:childTnLst>
+                  <p:par>
+                    <p:cTn id="3" fill="hold">
+                      <p:stCondLst>
+                        <p:cond delay="indefinite"/>
+                      </p:stCondLst>
+                      <p:childTnLst>
+                        <p:par>
+                          <p:cTn id="4" fill="hold">
+                            <p:stCondLst>
+                              <p:cond delay="0"/>
+                            </p:stCondLst>
+                            <p:childTnLst>
+                              <p:par>
+                                <p:cTn id="5" presetID="21" presetClass="entr" presetSubtype="1" fill="hold" grpId="0" nodeType="clickEffect">
+                                  <p:stCondLst>
+                                    <p:cond delay="0"/>
+                                  </p:stCondLst>
+                                  <p:childTnLst>
+                                    <p:set>
+                                      <p:cBhvr>
+                                        <p:cTn id="6" dur="1" fill="hold">
+                                          <p:stCondLst>
+                                            <p:cond delay="0"/>
+                                          </p:stCondLst>
+                                        </p:cTn>
+                                        <p:tgtEl>
+                                          <p:spTgt spid="3"/>
+                                        </p:tgtEl>
+                                        <p:attrNameLst>
+                                          <p:attrName>style.visibility</p:attrName>
+                                        </p:attrNameLst>
+                                      </p:cBhvr>
+                                      <p:to>
+                                        <p:strVal val="visible"/>
+                                      </p:to>
+                                    </p:set>
+                                    <p:animEffect transition="in" filter="wheel(1)">
+                                      <p:cBhvr>
+                                        <p:cTn id="7" dur="1000"/>
+                                        <p:tgtEl>
+                                          <p:spTgt spid="3"/>
+                                        </p:tgtEl>
+                                      </p:cBhvr>
+                                    </p:animEffect>
+                                  </p:childTnLst>
+                                </p:cTn>
+                              </p:par>
+                            </p:childTnLst>
+                          </p:cTn>
+                        </p:par>
+                      </p:childTnLst>
+                    </p:cTn>
+                  </p:par>
+                </p:childTnLst>
+              </p:cTn>
+              <p:prevCondLst>
+                <p:cond evt="onPrev" delay="0">
+                  <p:tgtEl>
+                    <p:sldTgt/>
+                  </p:tgtEl>
+                </p:cond>
+              </p:prevCondLst>
+              <p:nextCondLst>
+                <p:cond evt="onNext" delay="0">
+                  <p:tgtEl>
+                    <p:sldTgt/>
+                  </p:tgtEl>
+                </p:cond>
+              </p:nextCondLst>
+            </p:seq>
+          </p:childTnLst>
+        </p:cTn>
+      </p:par>
+    </p:tnLst>
+    <p:bldLst>
+      <p:bldP spid="3" grpId="0" animBg="1"/>
+    </p:bldLst>
+  </p:timing>
 </p:sld>
 </file>
 
@@ -32576,7 +33503,7 @@
             <p:ph idx="1"/>
             <p:extLst>
               <p:ext uri="{D42A27DB-BD31-4B8C-83A1-F6EECF244321}">
-                <p14:modId xmlns:p14="http://schemas.microsoft.com/office/powerpoint/2010/main" val="126792118"/>
+                <p14:modId xmlns:p14="http://schemas.microsoft.com/office/powerpoint/2010/main" val="657116062"/>
               </p:ext>
             </p:extLst>
           </p:nvPr>
@@ -32874,7 +33801,7 @@
                                         <p:tgtEl>
                                           <p:spTgt spid="4">
                                             <p:graphicEl>
-                                              <a:dgm id="{4EA41DB7-8C19-4881-9813-A50D7B5F07AC}"/>
+                                              <a:dgm id="{B52A4B34-9AE9-4308-A5BA-03A9720E701F}"/>
                                             </p:graphicEl>
                                           </p:spTgt>
                                         </p:tgtEl>
@@ -32892,7 +33819,7 @@
                                         <p:tgtEl>
                                           <p:spTgt spid="4">
                                             <p:graphicEl>
-                                              <a:dgm id="{4EA41DB7-8C19-4881-9813-A50D7B5F07AC}"/>
+                                              <a:dgm id="{B52A4B34-9AE9-4308-A5BA-03A9720E701F}"/>
                                             </p:graphicEl>
                                           </p:spTgt>
                                         </p:tgtEl>
@@ -32978,7 +33905,7 @@
                                         <p:tgtEl>
                                           <p:spTgt spid="4">
                                             <p:graphicEl>
-                                              <a:dgm id="{9D10D5FB-E245-41A7-AD7C-ABFCFD6B55DC}"/>
+                                              <a:dgm id="{B6A8617C-5A78-4827-B647-AB323D1BCDCC}"/>
                                             </p:graphicEl>
                                           </p:spTgt>
                                         </p:tgtEl>
@@ -32996,7 +33923,7 @@
                                         <p:tgtEl>
                                           <p:spTgt spid="4">
                                             <p:graphicEl>
-                                              <a:dgm id="{9D10D5FB-E245-41A7-AD7C-ABFCFD6B55DC}"/>
+                                              <a:dgm id="{B6A8617C-5A78-4827-B647-AB323D1BCDCC}"/>
                                             </p:graphicEl>
                                           </p:spTgt>
                                         </p:tgtEl>
@@ -33281,6 +34208,52 @@
           </a:p>
         </p:txBody>
       </p:sp>
+      <p:sp>
+        <p:nvSpPr>
+          <p:cNvPr id="4" name="Rectangle 3">
+            <a:extLst>
+              <a:ext uri="{FF2B5EF4-FFF2-40B4-BE49-F238E27FC236}">
+                <a16:creationId xmlns:a16="http://schemas.microsoft.com/office/drawing/2014/main" id="{2A9BD631-EA8E-4037-BB0D-400E85B5CC77}"/>
+              </a:ext>
+            </a:extLst>
+          </p:cNvPr>
+          <p:cNvSpPr/>
+          <p:nvPr/>
+        </p:nvSpPr>
+        <p:spPr>
+          <a:xfrm>
+            <a:off x="4105836" y="511362"/>
+            <a:ext cx="2814917" cy="513977"/>
+          </a:xfrm>
+          <a:prstGeom prst="rect">
+            <a:avLst/>
+          </a:prstGeom>
+        </p:spPr>
+        <p:style>
+          <a:lnRef idx="2">
+            <a:schemeClr val="dk1">
+              <a:shade val="50000"/>
+            </a:schemeClr>
+          </a:lnRef>
+          <a:fillRef idx="1">
+            <a:schemeClr val="dk1"/>
+          </a:fillRef>
+          <a:effectRef idx="0">
+            <a:schemeClr val="dk1"/>
+          </a:effectRef>
+          <a:fontRef idx="minor">
+            <a:schemeClr val="lt1"/>
+          </a:fontRef>
+        </p:style>
+        <p:txBody>
+          <a:bodyPr rtlCol="0" anchor="ctr"/>
+          <a:lstStyle/>
+          <a:p>
+            <a:pPr algn="ctr"/>
+            <a:endParaRPr lang="en-ZA"/>
+          </a:p>
+        </p:txBody>
+      </p:sp>
     </p:spTree>
     <p:extLst>
       <p:ext uri="{BB962C8B-B14F-4D97-AF65-F5344CB8AC3E}">
@@ -33315,7 +34288,7 @@
                             </p:stCondLst>
                             <p:childTnLst>
                               <p:par>
-                                <p:cTn id="5" presetID="10" presetClass="entr" presetSubtype="0" fill="hold" nodeType="clickEffect">
+                                <p:cTn id="5" presetID="22" presetClass="entr" presetSubtype="8" fill="hold" grpId="0" nodeType="clickEffect">
                                   <p:stCondLst>
                                     <p:cond delay="0"/>
                                   </p:stCondLst>
@@ -33328,7 +34301,7 @@
                                           </p:stCondLst>
                                         </p:cTn>
                                         <p:tgtEl>
-                                          <p:spTgt spid="1028"/>
+                                          <p:spTgt spid="4"/>
                                         </p:tgtEl>
                                         <p:attrNameLst>
                                           <p:attrName>style.visibility</p:attrName>
@@ -33338,11 +34311,11 @@
                                         <p:strVal val="visible"/>
                                       </p:to>
                                     </p:set>
-                                    <p:animEffect transition="in" filter="fade">
+                                    <p:animEffect transition="in" filter="wipe(left)">
                                       <p:cBhvr>
                                         <p:cTn id="7" dur="500"/>
                                         <p:tgtEl>
-                                          <p:spTgt spid="1028"/>
+                                          <p:spTgt spid="4"/>
                                         </p:tgtEl>
                                       </p:cBhvr>
                                     </p:animEffect>
@@ -33368,7 +34341,7 @@
                             </p:stCondLst>
                             <p:childTnLst>
                               <p:par>
-                                <p:cTn id="10" presetID="21" presetClass="entr" presetSubtype="1" fill="hold" grpId="0" nodeType="clickEffect">
+                                <p:cTn id="10" presetID="22" presetClass="entr" presetSubtype="8" fill="hold" grpId="0" nodeType="clickEffect">
                                   <p:stCondLst>
                                     <p:cond delay="0"/>
                                   </p:stCondLst>
@@ -33376,6 +34349,112 @@
                                     <p:set>
                                       <p:cBhvr>
                                         <p:cTn id="11" dur="1" fill="hold">
+                                          <p:stCondLst>
+                                            <p:cond delay="0"/>
+                                          </p:stCondLst>
+                                        </p:cTn>
+                                        <p:tgtEl>
+                                          <p:spTgt spid="6"/>
+                                        </p:tgtEl>
+                                        <p:attrNameLst>
+                                          <p:attrName>style.visibility</p:attrName>
+                                        </p:attrNameLst>
+                                      </p:cBhvr>
+                                      <p:to>
+                                        <p:strVal val="visible"/>
+                                      </p:to>
+                                    </p:set>
+                                    <p:animEffect transition="in" filter="wipe(left)">
+                                      <p:cBhvr>
+                                        <p:cTn id="12" dur="500"/>
+                                        <p:tgtEl>
+                                          <p:spTgt spid="6"/>
+                                        </p:tgtEl>
+                                      </p:cBhvr>
+                                    </p:animEffect>
+                                  </p:childTnLst>
+                                </p:cTn>
+                              </p:par>
+                            </p:childTnLst>
+                          </p:cTn>
+                        </p:par>
+                      </p:childTnLst>
+                    </p:cTn>
+                  </p:par>
+                  <p:par>
+                    <p:cTn id="13" fill="hold">
+                      <p:stCondLst>
+                        <p:cond delay="indefinite"/>
+                      </p:stCondLst>
+                      <p:childTnLst>
+                        <p:par>
+                          <p:cTn id="14" fill="hold">
+                            <p:stCondLst>
+                              <p:cond delay="0"/>
+                            </p:stCondLst>
+                            <p:childTnLst>
+                              <p:par>
+                                <p:cTn id="15" presetID="10" presetClass="entr" presetSubtype="0" fill="hold" nodeType="clickEffect">
+                                  <p:stCondLst>
+                                    <p:cond delay="0"/>
+                                  </p:stCondLst>
+                                  <p:childTnLst>
+                                    <p:set>
+                                      <p:cBhvr>
+                                        <p:cTn id="16" dur="1" fill="hold">
+                                          <p:stCondLst>
+                                            <p:cond delay="0"/>
+                                          </p:stCondLst>
+                                        </p:cTn>
+                                        <p:tgtEl>
+                                          <p:spTgt spid="1028"/>
+                                        </p:tgtEl>
+                                        <p:attrNameLst>
+                                          <p:attrName>style.visibility</p:attrName>
+                                        </p:attrNameLst>
+                                      </p:cBhvr>
+                                      <p:to>
+                                        <p:strVal val="visible"/>
+                                      </p:to>
+                                    </p:set>
+                                    <p:animEffect transition="in" filter="fade">
+                                      <p:cBhvr>
+                                        <p:cTn id="17" dur="500"/>
+                                        <p:tgtEl>
+                                          <p:spTgt spid="1028"/>
+                                        </p:tgtEl>
+                                      </p:cBhvr>
+                                    </p:animEffect>
+                                  </p:childTnLst>
+                                </p:cTn>
+                              </p:par>
+                            </p:childTnLst>
+                          </p:cTn>
+                        </p:par>
+                      </p:childTnLst>
+                    </p:cTn>
+                  </p:par>
+                  <p:par>
+                    <p:cTn id="18" fill="hold">
+                      <p:stCondLst>
+                        <p:cond delay="indefinite"/>
+                      </p:stCondLst>
+                      <p:childTnLst>
+                        <p:par>
+                          <p:cTn id="19" fill="hold">
+                            <p:stCondLst>
+                              <p:cond delay="0"/>
+                            </p:stCondLst>
+                            <p:childTnLst>
+                              <p:par>
+                                <p:cTn id="20" presetID="21" presetClass="entr" presetSubtype="1" fill="hold" grpId="0" nodeType="clickEffect">
+                                  <p:stCondLst>
+                                    <p:cond delay="0"/>
+                                  </p:stCondLst>
+                                  <p:childTnLst>
+                                    <p:set>
+                                      <p:cBhvr>
+                                        <p:cTn id="21" dur="1" fill="hold">
                                           <p:stCondLst>
                                             <p:cond delay="0"/>
                                           </p:stCondLst>
@@ -33393,7 +34472,7 @@
                                     </p:set>
                                     <p:animEffect transition="in" filter="wheel(1)">
                                       <p:cBhvr>
-                                        <p:cTn id="12" dur="500"/>
+                                        <p:cTn id="22" dur="500"/>
                                         <p:tgtEl>
                                           <p:spTgt spid="5"/>
                                         </p:tgtEl>
@@ -33430,7 +34509,9 @@
       </p:par>
     </p:tnLst>
     <p:bldLst>
+      <p:bldP spid="6" grpId="0"/>
       <p:bldP spid="5" grpId="0" animBg="1"/>
+      <p:bldP spid="4" grpId="0" animBg="1"/>
     </p:bldLst>
   </p:timing>
 </p:sld>

</xml_diff>